<commit_message>
PPTX -> Korrektur von Fehlern PDF -> ist jetzt die ausgedruckte Version (physisch abgegeben am Mo, 20.11.2017 um 10:00 Uhr)
</commit_message>
<xml_diff>
--- a/Präsi_Requirements.pptx
+++ b/Präsi_Requirements.pptx
@@ -2996,6 +2996,10 @@
           <a:bodyPr/>
           <a:lstStyle/>
           <a:p>
+            <a:r>
+              <a:rPr lang="de-DE"/>
+              <a:t/>
+            </a:r>
             <a:br>
               <a:rPr lang="de-DE"/>
             </a:br>
@@ -3006,6 +3010,10 @@
             <a:br>
               <a:rPr lang="de-DE"/>
             </a:br>
+            <a:r>
+              <a:rPr lang="de-DE"/>
+              <a:t/>
+            </a:r>
             <a:br>
               <a:rPr lang="de-DE"/>
             </a:br>
@@ -3546,7 +3554,7 @@
           <p:cNvPr id="2" name="Titel 1">
             <a:extLst>
               <a:ext uri="{FF2B5EF4-FFF2-40B4-BE49-F238E27FC236}">
-                <a16:creationId xmlns:a16="http://schemas.microsoft.com/office/drawing/2014/main" id="{D0906378-B0DE-4FBD-8795-C75AA5D9BE5F}"/>
+                <a16:creationId xmlns:a16="http://schemas.microsoft.com/office/drawing/2014/main" xmlns="" id="{D0906378-B0DE-4FBD-8795-C75AA5D9BE5F}"/>
               </a:ext>
             </a:extLst>
           </p:cNvPr>
@@ -3564,8 +3572,8 @@
           <a:p>
             <a:pPr algn="ctr"/>
             <a:r>
-              <a:rPr lang="de-DE" dirty="0" err="1"/>
-              <a:t>Systemrequirements</a:t>
+              <a:rPr lang="de-DE" smtClean="0"/>
+              <a:t>System Requirements</a:t>
             </a:r>
             <a:endParaRPr lang="de-DE" dirty="0"/>
           </a:p>
@@ -3576,7 +3584,7 @@
           <p:cNvPr id="3" name="Inhaltsplatzhalter 2">
             <a:extLst>
               <a:ext uri="{FF2B5EF4-FFF2-40B4-BE49-F238E27FC236}">
-                <a16:creationId xmlns:a16="http://schemas.microsoft.com/office/drawing/2014/main" id="{79826641-65A9-4C2F-83AD-48817B716780}"/>
+                <a16:creationId xmlns:a16="http://schemas.microsoft.com/office/drawing/2014/main" xmlns="" id="{79826641-65A9-4C2F-83AD-48817B716780}"/>
               </a:ext>
             </a:extLst>
           </p:cNvPr>
@@ -3701,43 +3709,10 @@
       </p:grpSpPr>
       <p:sp>
         <p:nvSpPr>
-          <p:cNvPr id="2" name="Titel 1">
-            <a:extLst>
-              <a:ext uri="{FF2B5EF4-FFF2-40B4-BE49-F238E27FC236}">
-                <a16:creationId xmlns:a16="http://schemas.microsoft.com/office/drawing/2014/main" id="{042214A6-4E70-4DD3-87BA-A398720DCCC3}"/>
-              </a:ext>
-            </a:extLst>
-          </p:cNvPr>
-          <p:cNvSpPr>
-            <a:spLocks noGrp="1"/>
-          </p:cNvSpPr>
-          <p:nvPr>
-            <p:ph type="title"/>
-          </p:nvPr>
-        </p:nvSpPr>
-        <p:spPr>
-          <a:xfrm flipH="1" flipV="1">
-            <a:off x="-257175" y="-238124"/>
-            <a:ext cx="1095375" cy="603250"/>
-          </a:xfrm>
-        </p:spPr>
-        <p:txBody>
-          <a:bodyPr>
-            <a:normAutofit fontScale="90000"/>
-          </a:bodyPr>
-          <a:lstStyle/>
-          <a:p>
-            <a:pPr algn="ctr"/>
-            <a:endParaRPr lang="de-DE" dirty="0"/>
-          </a:p>
-        </p:txBody>
-      </p:sp>
-      <p:sp>
-        <p:nvSpPr>
           <p:cNvPr id="3" name="Inhaltsplatzhalter 2">
             <a:extLst>
               <a:ext uri="{FF2B5EF4-FFF2-40B4-BE49-F238E27FC236}">
-                <a16:creationId xmlns:a16="http://schemas.microsoft.com/office/drawing/2014/main" id="{8D4F619E-95AB-45CB-8E91-113A697041A2}"/>
+                <a16:creationId xmlns:a16="http://schemas.microsoft.com/office/drawing/2014/main" xmlns="" id="{8D4F619E-95AB-45CB-8E91-113A697041A2}"/>
               </a:ext>
             </a:extLst>
           </p:cNvPr>
@@ -3884,7 +3859,7 @@
           <p:cNvPr id="2" name="Titel 1">
             <a:extLst>
               <a:ext uri="{FF2B5EF4-FFF2-40B4-BE49-F238E27FC236}">
-                <a16:creationId xmlns:a16="http://schemas.microsoft.com/office/drawing/2014/main" id="{990FDC04-66A3-4FD6-B4C8-0EFE4909D837}"/>
+                <a16:creationId xmlns:a16="http://schemas.microsoft.com/office/drawing/2014/main" xmlns="" id="{990FDC04-66A3-4FD6-B4C8-0EFE4909D837}"/>
               </a:ext>
             </a:extLst>
           </p:cNvPr>
@@ -3908,9 +3883,10 @@
           <a:lstStyle/>
           <a:p>
             <a:r>
-              <a:rPr lang="de-DE" dirty="0"/>
-              <a:t>Main Properties</a:t>
-            </a:r>
+              <a:rPr lang="de-DE" smtClean="0"/>
+              <a:t>Haupt-Eigenschaften von Requirements</a:t>
+            </a:r>
+            <a:endParaRPr lang="de-DE" dirty="0"/>
           </a:p>
         </p:txBody>
       </p:sp>
@@ -3919,7 +3895,7 @@
           <p:cNvPr id="3" name="Inhaltsplatzhalter 2">
             <a:extLst>
               <a:ext uri="{FF2B5EF4-FFF2-40B4-BE49-F238E27FC236}">
-                <a16:creationId xmlns:a16="http://schemas.microsoft.com/office/drawing/2014/main" id="{142E594E-C74B-468D-A9D0-3083E64A491F}"/>
+                <a16:creationId xmlns:a16="http://schemas.microsoft.com/office/drawing/2014/main" xmlns="" id="{142E594E-C74B-468D-A9D0-3083E64A491F}"/>
               </a:ext>
             </a:extLst>
           </p:cNvPr>
@@ -3956,9 +3932,26 @@
               <a:t></a:t>
             </a:r>
             <a:r>
+              <a:rPr lang="de-DE"/>
+              <a:t>Bedürfnisse/Wünsche </a:t>
+            </a:r>
+            <a:r>
+              <a:rPr lang="de-DE" smtClean="0"/>
+              <a:t>(werden vom Stakeholder </a:t>
+            </a:r>
+            <a:r>
               <a:rPr lang="de-DE" dirty="0"/>
-              <a:t>Bedürfnisse/Wünsche vom Stakeholder  an die App gestellt werden</a:t>
-            </a:r>
+              <a:t>an die </a:t>
+            </a:r>
+            <a:r>
+              <a:rPr lang="de-DE"/>
+              <a:t>App </a:t>
+            </a:r>
+            <a:r>
+              <a:rPr lang="de-DE" smtClean="0"/>
+              <a:t>gestellt)</a:t>
+            </a:r>
+            <a:endParaRPr lang="de-DE" dirty="0"/>
           </a:p>
           <a:p>
             <a:pPr marL="0" indent="0">
@@ -4026,7 +4019,7 @@
           <p:cNvPr id="2" name="Titel 1">
             <a:extLst>
               <a:ext uri="{FF2B5EF4-FFF2-40B4-BE49-F238E27FC236}">
-                <a16:creationId xmlns:a16="http://schemas.microsoft.com/office/drawing/2014/main" id="{75DFA60C-68DF-47E3-923E-8E3E3B205A99}"/>
+                <a16:creationId xmlns:a16="http://schemas.microsoft.com/office/drawing/2014/main" xmlns="" id="{75DFA60C-68DF-47E3-923E-8E3E3B205A99}"/>
               </a:ext>
             </a:extLst>
           </p:cNvPr>
@@ -4050,8 +4043,12 @@
           <a:lstStyle/>
           <a:p>
             <a:r>
+              <a:rPr lang="de-DE" smtClean="0"/>
+              <a:t>Weitere Eigenschaften </a:t>
+            </a:r>
+            <a:r>
               <a:rPr lang="de-DE" dirty="0"/>
-              <a:t>Eigenschaften von </a:t>
+              <a:t>von </a:t>
             </a:r>
             <a:r>
               <a:rPr lang="de-DE"/>
@@ -4066,7 +4063,7 @@
           <p:cNvPr id="3" name="Inhaltsplatzhalter 2">
             <a:extLst>
               <a:ext uri="{FF2B5EF4-FFF2-40B4-BE49-F238E27FC236}">
-                <a16:creationId xmlns:a16="http://schemas.microsoft.com/office/drawing/2014/main" id="{219249C6-8440-47B8-9F4C-7F856A639D04}"/>
+                <a16:creationId xmlns:a16="http://schemas.microsoft.com/office/drawing/2014/main" xmlns="" id="{219249C6-8440-47B8-9F4C-7F856A639D04}"/>
               </a:ext>
             </a:extLst>
           </p:cNvPr>

</xml_diff>

<commit_message>
Unnötige pptx-Versionen gelöscht, PDF korrekt erzeugt.
</commit_message>
<xml_diff>
--- a/Präsi_Requirements.pptx
+++ b/Präsi_Requirements.pptx
@@ -13,9 +13,13 @@
     <p:sldId id="261" r:id="rId7"/>
     <p:sldId id="262" r:id="rId8"/>
     <p:sldId id="263" r:id="rId9"/>
+    <p:sldId id="264" r:id="rId10"/>
+    <p:sldId id="265" r:id="rId11"/>
+    <p:sldId id="266" r:id="rId12"/>
+    <p:sldId id="267" r:id="rId13"/>
   </p:sldIdLst>
   <p:sldSz cx="12192000" cy="6858000"/>
-  <p:notesSz cx="6858000" cy="9144000"/>
+  <p:notesSz cx="7099300" cy="10234613"/>
   <p:defaultTextStyle>
     <a:defPPr>
       <a:defRPr lang="de-DE"/>
@@ -252,7 +256,7 @@
           <a:p>
             <a:fld id="{D93D517E-AA1F-459F-8DA6-D536446271DE}" type="datetimeFigureOut">
               <a:rPr lang="de-DE" smtClean="0"/>
-              <a:t>20.11.2017</a:t>
+              <a:t>21.11.2017</a:t>
             </a:fld>
             <a:endParaRPr lang="de-DE"/>
           </a:p>
@@ -420,7 +424,7 @@
           <a:p>
             <a:fld id="{D93D517E-AA1F-459F-8DA6-D536446271DE}" type="datetimeFigureOut">
               <a:rPr lang="de-DE" smtClean="0"/>
-              <a:t>20.11.2017</a:t>
+              <a:t>21.11.2017</a:t>
             </a:fld>
             <a:endParaRPr lang="de-DE"/>
           </a:p>
@@ -598,7 +602,7 @@
           <a:p>
             <a:fld id="{D93D517E-AA1F-459F-8DA6-D536446271DE}" type="datetimeFigureOut">
               <a:rPr lang="de-DE" smtClean="0"/>
-              <a:t>20.11.2017</a:t>
+              <a:t>21.11.2017</a:t>
             </a:fld>
             <a:endParaRPr lang="de-DE"/>
           </a:p>
@@ -766,7 +770,7 @@
           <a:p>
             <a:fld id="{D93D517E-AA1F-459F-8DA6-D536446271DE}" type="datetimeFigureOut">
               <a:rPr lang="de-DE" smtClean="0"/>
-              <a:t>20.11.2017</a:t>
+              <a:t>21.11.2017</a:t>
             </a:fld>
             <a:endParaRPr lang="de-DE"/>
           </a:p>
@@ -1011,7 +1015,7 @@
           <a:p>
             <a:fld id="{D93D517E-AA1F-459F-8DA6-D536446271DE}" type="datetimeFigureOut">
               <a:rPr lang="de-DE" smtClean="0"/>
-              <a:t>20.11.2017</a:t>
+              <a:t>21.11.2017</a:t>
             </a:fld>
             <a:endParaRPr lang="de-DE"/>
           </a:p>
@@ -1240,7 +1244,7 @@
           <a:p>
             <a:fld id="{D93D517E-AA1F-459F-8DA6-D536446271DE}" type="datetimeFigureOut">
               <a:rPr lang="de-DE" smtClean="0"/>
-              <a:t>20.11.2017</a:t>
+              <a:t>21.11.2017</a:t>
             </a:fld>
             <a:endParaRPr lang="de-DE"/>
           </a:p>
@@ -1604,7 +1608,7 @@
           <a:p>
             <a:fld id="{D93D517E-AA1F-459F-8DA6-D536446271DE}" type="datetimeFigureOut">
               <a:rPr lang="de-DE" smtClean="0"/>
-              <a:t>20.11.2017</a:t>
+              <a:t>21.11.2017</a:t>
             </a:fld>
             <a:endParaRPr lang="de-DE"/>
           </a:p>
@@ -1721,7 +1725,7 @@
           <a:p>
             <a:fld id="{D93D517E-AA1F-459F-8DA6-D536446271DE}" type="datetimeFigureOut">
               <a:rPr lang="de-DE" smtClean="0"/>
-              <a:t>20.11.2017</a:t>
+              <a:t>21.11.2017</a:t>
             </a:fld>
             <a:endParaRPr lang="de-DE"/>
           </a:p>
@@ -1816,7 +1820,7 @@
           <a:p>
             <a:fld id="{D93D517E-AA1F-459F-8DA6-D536446271DE}" type="datetimeFigureOut">
               <a:rPr lang="de-DE" smtClean="0"/>
-              <a:t>20.11.2017</a:t>
+              <a:t>21.11.2017</a:t>
             </a:fld>
             <a:endParaRPr lang="de-DE"/>
           </a:p>
@@ -2091,7 +2095,7 @@
           <a:p>
             <a:fld id="{D93D517E-AA1F-459F-8DA6-D536446271DE}" type="datetimeFigureOut">
               <a:rPr lang="de-DE" smtClean="0"/>
-              <a:t>20.11.2017</a:t>
+              <a:t>21.11.2017</a:t>
             </a:fld>
             <a:endParaRPr lang="de-DE"/>
           </a:p>
@@ -2343,7 +2347,7 @@
           <a:p>
             <a:fld id="{D93D517E-AA1F-459F-8DA6-D536446271DE}" type="datetimeFigureOut">
               <a:rPr lang="de-DE" smtClean="0"/>
-              <a:t>20.11.2017</a:t>
+              <a:t>21.11.2017</a:t>
             </a:fld>
             <a:endParaRPr lang="de-DE"/>
           </a:p>
@@ -2554,7 +2558,7 @@
           <a:p>
             <a:fld id="{D93D517E-AA1F-459F-8DA6-D536446271DE}" type="datetimeFigureOut">
               <a:rPr lang="de-DE" smtClean="0"/>
-              <a:t>20.11.2017</a:t>
+              <a:t>21.11.2017</a:t>
             </a:fld>
             <a:endParaRPr lang="de-DE"/>
           </a:p>
@@ -3038,6 +3042,2544 @@
 </p:sld>
 </file>
 
+<file path=ppt/slides/slide10.xml><?xml version="1.0" encoding="utf-8"?>
+<p:sld xmlns:a="http://schemas.openxmlformats.org/drawingml/2006/main" xmlns:r="http://schemas.openxmlformats.org/officeDocument/2006/relationships" xmlns:p="http://schemas.openxmlformats.org/presentationml/2006/main">
+  <p:cSld>
+    <p:spTree>
+      <p:nvGrpSpPr>
+        <p:cNvPr id="1" name=""/>
+        <p:cNvGrpSpPr/>
+        <p:nvPr/>
+      </p:nvGrpSpPr>
+      <p:grpSpPr>
+        <a:xfrm>
+          <a:off x="0" y="0"/>
+          <a:ext cx="0" cy="0"/>
+          <a:chOff x="0" y="0"/>
+          <a:chExt cx="0" cy="0"/>
+        </a:xfrm>
+      </p:grpSpPr>
+      <p:sp>
+        <p:nvSpPr>
+          <p:cNvPr id="2" name="Titel 1"/>
+          <p:cNvSpPr>
+            <a:spLocks noGrp="1"/>
+          </p:cNvSpPr>
+          <p:nvPr>
+            <p:ph type="title"/>
+          </p:nvPr>
+        </p:nvSpPr>
+        <p:spPr/>
+        <p:txBody>
+          <a:bodyPr/>
+          <a:lstStyle/>
+          <a:p>
+            <a:r>
+              <a:rPr lang="de-DE" spc="-1">
+                <a:solidFill>
+                  <a:srgbClr val="000000"/>
+                </a:solidFill>
+                <a:uFill>
+                  <a:solidFill>
+                    <a:srgbClr val="FFFFFF"/>
+                  </a:solidFill>
+                </a:uFill>
+                <a:ea typeface="DejaVu Sans"/>
+              </a:rPr>
+              <a:t>Registrierung – Was </a:t>
+            </a:r>
+            <a:r>
+              <a:rPr lang="de-DE" spc="-1">
+                <a:solidFill>
+                  <a:srgbClr val="000000"/>
+                </a:solidFill>
+                <a:uFill>
+                  <a:solidFill>
+                    <a:srgbClr val="FFFFFF"/>
+                  </a:solidFill>
+                </a:uFill>
+                <a:ea typeface="DejaVu Sans"/>
+              </a:rPr>
+              <a:t>passieren </a:t>
+            </a:r>
+            <a:r>
+              <a:rPr lang="de-DE" spc="-1" smtClean="0">
+                <a:solidFill>
+                  <a:srgbClr val="000000"/>
+                </a:solidFill>
+                <a:uFill>
+                  <a:solidFill>
+                    <a:srgbClr val="FFFFFF"/>
+                  </a:solidFill>
+                </a:uFill>
+                <a:ea typeface="DejaVu Sans"/>
+              </a:rPr>
+              <a:t>sollte</a:t>
+            </a:r>
+            <a:endParaRPr lang="de-DE"/>
+          </a:p>
+        </p:txBody>
+      </p:sp>
+      <p:sp>
+        <p:nvSpPr>
+          <p:cNvPr id="3" name="Inhaltsplatzhalter 2"/>
+          <p:cNvSpPr>
+            <a:spLocks noGrp="1"/>
+          </p:cNvSpPr>
+          <p:nvPr>
+            <p:ph idx="1"/>
+          </p:nvPr>
+        </p:nvSpPr>
+        <p:spPr>
+          <a:xfrm>
+            <a:off x="838200" y="1825625"/>
+            <a:ext cx="4892899" cy="4351338"/>
+          </a:xfrm>
+        </p:spPr>
+        <p:txBody>
+          <a:bodyPr/>
+          <a:lstStyle/>
+          <a:p>
+            <a:pPr marL="432000" indent="-323280">
+              <a:lnSpc>
+                <a:spcPct val="115000"/>
+              </a:lnSpc>
+              <a:buClr>
+                <a:srgbClr val="000000"/>
+              </a:buClr>
+              <a:buSzPct val="45000"/>
+              <a:buFont typeface="Wingdings" charset="2"/>
+              <a:buChar char=""/>
+            </a:pPr>
+            <a:r>
+              <a:rPr lang="de-DE" spc="-1">
+                <a:solidFill>
+                  <a:srgbClr val="000000"/>
+                </a:solidFill>
+                <a:uFill>
+                  <a:solidFill>
+                    <a:srgbClr val="FFFFFF"/>
+                  </a:solidFill>
+                </a:uFill>
+                <a:ea typeface="DejaVu Sans"/>
+              </a:rPr>
+              <a:t>Die Person installiert die App über den Google Play </a:t>
+            </a:r>
+            <a:r>
+              <a:rPr lang="de-DE" spc="-1">
+                <a:solidFill>
+                  <a:srgbClr val="000000"/>
+                </a:solidFill>
+                <a:uFill>
+                  <a:solidFill>
+                    <a:srgbClr val="FFFFFF"/>
+                  </a:solidFill>
+                </a:uFill>
+                <a:ea typeface="DejaVu Sans"/>
+              </a:rPr>
+              <a:t>Store</a:t>
+            </a:r>
+            <a:r>
+              <a:rPr lang="de-DE" spc="-1" smtClean="0">
+                <a:solidFill>
+                  <a:srgbClr val="000000"/>
+                </a:solidFill>
+                <a:uFill>
+                  <a:solidFill>
+                    <a:srgbClr val="FFFFFF"/>
+                  </a:solidFill>
+                </a:uFill>
+                <a:ea typeface="DejaVu Sans"/>
+              </a:rPr>
+              <a:t>.</a:t>
+            </a:r>
+            <a:endParaRPr lang="de-DE" sz="1800" spc="-1">
+              <a:solidFill>
+                <a:srgbClr val="000000"/>
+              </a:solidFill>
+              <a:uFill>
+                <a:solidFill>
+                  <a:srgbClr val="FFFFFF"/>
+                </a:solidFill>
+              </a:uFill>
+            </a:endParaRPr>
+          </a:p>
+          <a:p>
+            <a:pPr marL="432000" indent="-323280">
+              <a:lnSpc>
+                <a:spcPct val="115000"/>
+              </a:lnSpc>
+              <a:buClr>
+                <a:srgbClr val="000000"/>
+              </a:buClr>
+              <a:buSzPct val="45000"/>
+              <a:buFont typeface="Wingdings" charset="2"/>
+              <a:buChar char=""/>
+            </a:pPr>
+            <a:r>
+              <a:rPr lang="de-DE" spc="-1">
+                <a:solidFill>
+                  <a:srgbClr val="000000"/>
+                </a:solidFill>
+                <a:uFill>
+                  <a:solidFill>
+                    <a:srgbClr val="FFFFFF"/>
+                  </a:solidFill>
+                </a:uFill>
+                <a:ea typeface="DejaVu Sans"/>
+              </a:rPr>
+              <a:t>Sie startet die App, die sich mit dem Server verbindet und einen Registrierungsbildschirm </a:t>
+            </a:r>
+            <a:r>
+              <a:rPr lang="de-DE" spc="-1">
+                <a:solidFill>
+                  <a:srgbClr val="000000"/>
+                </a:solidFill>
+                <a:uFill>
+                  <a:solidFill>
+                    <a:srgbClr val="FFFFFF"/>
+                  </a:solidFill>
+                </a:uFill>
+                <a:ea typeface="DejaVu Sans"/>
+              </a:rPr>
+              <a:t>anzeigt</a:t>
+            </a:r>
+            <a:r>
+              <a:rPr lang="de-DE" spc="-1" smtClean="0">
+                <a:solidFill>
+                  <a:srgbClr val="000000"/>
+                </a:solidFill>
+                <a:uFill>
+                  <a:solidFill>
+                    <a:srgbClr val="FFFFFF"/>
+                  </a:solidFill>
+                </a:uFill>
+                <a:ea typeface="DejaVu Sans"/>
+              </a:rPr>
+              <a:t>.</a:t>
+            </a:r>
+            <a:endParaRPr lang="de-DE" sz="1800" spc="-1">
+              <a:solidFill>
+                <a:srgbClr val="000000"/>
+              </a:solidFill>
+              <a:uFill>
+                <a:solidFill>
+                  <a:srgbClr val="FFFFFF"/>
+                </a:solidFill>
+              </a:uFill>
+            </a:endParaRPr>
+          </a:p>
+        </p:txBody>
+      </p:sp>
+      <p:sp>
+        <p:nvSpPr>
+          <p:cNvPr id="6" name="Inhaltsplatzhalter 2"/>
+          <p:cNvSpPr txBox="1">
+            <a:spLocks/>
+          </p:cNvSpPr>
+          <p:nvPr/>
+        </p:nvSpPr>
+        <p:spPr>
+          <a:xfrm>
+            <a:off x="6096000" y="1690688"/>
+            <a:ext cx="4892899" cy="4351338"/>
+          </a:xfrm>
+          <a:prstGeom prst="rect">
+            <a:avLst/>
+          </a:prstGeom>
+        </p:spPr>
+        <p:txBody>
+          <a:bodyPr vert="horz" lIns="91440" tIns="45720" rIns="91440" bIns="45720" rtlCol="0">
+            <a:normAutofit fontScale="92500" lnSpcReduction="20000"/>
+          </a:bodyPr>
+          <a:lstStyle>
+            <a:lvl1pPr marL="228600" indent="-228600" algn="l" defTabSz="914400" rtl="0" eaLnBrk="1" latinLnBrk="0" hangingPunct="1">
+              <a:lnSpc>
+                <a:spcPct val="90000"/>
+              </a:lnSpc>
+              <a:spcBef>
+                <a:spcPts val="1000"/>
+              </a:spcBef>
+              <a:buFont typeface="Arial" panose="020B0604020202020204" pitchFamily="34" charset="0"/>
+              <a:buChar char="•"/>
+              <a:defRPr sz="2800" kern="1200">
+                <a:solidFill>
+                  <a:schemeClr val="tx1"/>
+                </a:solidFill>
+                <a:latin typeface="+mn-lt"/>
+                <a:ea typeface="+mn-ea"/>
+                <a:cs typeface="+mn-cs"/>
+              </a:defRPr>
+            </a:lvl1pPr>
+            <a:lvl2pPr marL="685800" indent="-228600" algn="l" defTabSz="914400" rtl="0" eaLnBrk="1" latinLnBrk="0" hangingPunct="1">
+              <a:lnSpc>
+                <a:spcPct val="90000"/>
+              </a:lnSpc>
+              <a:spcBef>
+                <a:spcPts val="500"/>
+              </a:spcBef>
+              <a:buFont typeface="Arial" panose="020B0604020202020204" pitchFamily="34" charset="0"/>
+              <a:buChar char="•"/>
+              <a:defRPr sz="2400" kern="1200">
+                <a:solidFill>
+                  <a:schemeClr val="tx1"/>
+                </a:solidFill>
+                <a:latin typeface="+mn-lt"/>
+                <a:ea typeface="+mn-ea"/>
+                <a:cs typeface="+mn-cs"/>
+              </a:defRPr>
+            </a:lvl2pPr>
+            <a:lvl3pPr marL="1143000" indent="-228600" algn="l" defTabSz="914400" rtl="0" eaLnBrk="1" latinLnBrk="0" hangingPunct="1">
+              <a:lnSpc>
+                <a:spcPct val="90000"/>
+              </a:lnSpc>
+              <a:spcBef>
+                <a:spcPts val="500"/>
+              </a:spcBef>
+              <a:buFont typeface="Arial" panose="020B0604020202020204" pitchFamily="34" charset="0"/>
+              <a:buChar char="•"/>
+              <a:defRPr sz="2000" kern="1200">
+                <a:solidFill>
+                  <a:schemeClr val="tx1"/>
+                </a:solidFill>
+                <a:latin typeface="+mn-lt"/>
+                <a:ea typeface="+mn-ea"/>
+                <a:cs typeface="+mn-cs"/>
+              </a:defRPr>
+            </a:lvl3pPr>
+            <a:lvl4pPr marL="1600200" indent="-228600" algn="l" defTabSz="914400" rtl="0" eaLnBrk="1" latinLnBrk="0" hangingPunct="1">
+              <a:lnSpc>
+                <a:spcPct val="90000"/>
+              </a:lnSpc>
+              <a:spcBef>
+                <a:spcPts val="500"/>
+              </a:spcBef>
+              <a:buFont typeface="Arial" panose="020B0604020202020204" pitchFamily="34" charset="0"/>
+              <a:buChar char="•"/>
+              <a:defRPr sz="1800" kern="1200">
+                <a:solidFill>
+                  <a:schemeClr val="tx1"/>
+                </a:solidFill>
+                <a:latin typeface="+mn-lt"/>
+                <a:ea typeface="+mn-ea"/>
+                <a:cs typeface="+mn-cs"/>
+              </a:defRPr>
+            </a:lvl4pPr>
+            <a:lvl5pPr marL="2057400" indent="-228600" algn="l" defTabSz="914400" rtl="0" eaLnBrk="1" latinLnBrk="0" hangingPunct="1">
+              <a:lnSpc>
+                <a:spcPct val="90000"/>
+              </a:lnSpc>
+              <a:spcBef>
+                <a:spcPts val="500"/>
+              </a:spcBef>
+              <a:buFont typeface="Arial" panose="020B0604020202020204" pitchFamily="34" charset="0"/>
+              <a:buChar char="•"/>
+              <a:defRPr sz="1800" kern="1200">
+                <a:solidFill>
+                  <a:schemeClr val="tx1"/>
+                </a:solidFill>
+                <a:latin typeface="+mn-lt"/>
+                <a:ea typeface="+mn-ea"/>
+                <a:cs typeface="+mn-cs"/>
+              </a:defRPr>
+            </a:lvl5pPr>
+            <a:lvl6pPr marL="2514600" indent="-228600" algn="l" defTabSz="914400" rtl="0" eaLnBrk="1" latinLnBrk="0" hangingPunct="1">
+              <a:lnSpc>
+                <a:spcPct val="90000"/>
+              </a:lnSpc>
+              <a:spcBef>
+                <a:spcPts val="500"/>
+              </a:spcBef>
+              <a:buFont typeface="Arial" panose="020B0604020202020204" pitchFamily="34" charset="0"/>
+              <a:buChar char="•"/>
+              <a:defRPr sz="1800" kern="1200">
+                <a:solidFill>
+                  <a:schemeClr val="tx1"/>
+                </a:solidFill>
+                <a:latin typeface="+mn-lt"/>
+                <a:ea typeface="+mn-ea"/>
+                <a:cs typeface="+mn-cs"/>
+              </a:defRPr>
+            </a:lvl6pPr>
+            <a:lvl7pPr marL="2971800" indent="-228600" algn="l" defTabSz="914400" rtl="0" eaLnBrk="1" latinLnBrk="0" hangingPunct="1">
+              <a:lnSpc>
+                <a:spcPct val="90000"/>
+              </a:lnSpc>
+              <a:spcBef>
+                <a:spcPts val="500"/>
+              </a:spcBef>
+              <a:buFont typeface="Arial" panose="020B0604020202020204" pitchFamily="34" charset="0"/>
+              <a:buChar char="•"/>
+              <a:defRPr sz="1800" kern="1200">
+                <a:solidFill>
+                  <a:schemeClr val="tx1"/>
+                </a:solidFill>
+                <a:latin typeface="+mn-lt"/>
+                <a:ea typeface="+mn-ea"/>
+                <a:cs typeface="+mn-cs"/>
+              </a:defRPr>
+            </a:lvl7pPr>
+            <a:lvl8pPr marL="3429000" indent="-228600" algn="l" defTabSz="914400" rtl="0" eaLnBrk="1" latinLnBrk="0" hangingPunct="1">
+              <a:lnSpc>
+                <a:spcPct val="90000"/>
+              </a:lnSpc>
+              <a:spcBef>
+                <a:spcPts val="500"/>
+              </a:spcBef>
+              <a:buFont typeface="Arial" panose="020B0604020202020204" pitchFamily="34" charset="0"/>
+              <a:buChar char="•"/>
+              <a:defRPr sz="1800" kern="1200">
+                <a:solidFill>
+                  <a:schemeClr val="tx1"/>
+                </a:solidFill>
+                <a:latin typeface="+mn-lt"/>
+                <a:ea typeface="+mn-ea"/>
+                <a:cs typeface="+mn-cs"/>
+              </a:defRPr>
+            </a:lvl8pPr>
+            <a:lvl9pPr marL="3886200" indent="-228600" algn="l" defTabSz="914400" rtl="0" eaLnBrk="1" latinLnBrk="0" hangingPunct="1">
+              <a:lnSpc>
+                <a:spcPct val="90000"/>
+              </a:lnSpc>
+              <a:spcBef>
+                <a:spcPts val="500"/>
+              </a:spcBef>
+              <a:buFont typeface="Arial" panose="020B0604020202020204" pitchFamily="34" charset="0"/>
+              <a:buChar char="•"/>
+              <a:defRPr sz="1800" kern="1200">
+                <a:solidFill>
+                  <a:schemeClr val="tx1"/>
+                </a:solidFill>
+                <a:latin typeface="+mn-lt"/>
+                <a:ea typeface="+mn-ea"/>
+                <a:cs typeface="+mn-cs"/>
+              </a:defRPr>
+            </a:lvl9pPr>
+          </a:lstStyle>
+          <a:p>
+            <a:pPr marL="432000" indent="-323280">
+              <a:lnSpc>
+                <a:spcPct val="115000"/>
+              </a:lnSpc>
+              <a:buClr>
+                <a:srgbClr val="000000"/>
+              </a:buClr>
+              <a:buSzPct val="45000"/>
+              <a:buFont typeface="Wingdings" charset="2"/>
+              <a:buChar char=""/>
+            </a:pPr>
+            <a:r>
+              <a:rPr lang="de-DE" sz="3000" spc="-1" smtClean="0">
+                <a:solidFill>
+                  <a:srgbClr val="000000"/>
+                </a:solidFill>
+                <a:uFill>
+                  <a:solidFill>
+                    <a:srgbClr val="FFFFFF"/>
+                  </a:solidFill>
+                </a:uFill>
+                <a:ea typeface="DejaVu Sans"/>
+              </a:rPr>
+              <a:t>Sie </a:t>
+            </a:r>
+            <a:r>
+              <a:rPr lang="de-DE" sz="3000" spc="-1">
+                <a:solidFill>
+                  <a:srgbClr val="000000"/>
+                </a:solidFill>
+                <a:uFill>
+                  <a:solidFill>
+                    <a:srgbClr val="FFFFFF"/>
+                  </a:solidFill>
+                </a:uFill>
+                <a:ea typeface="DejaVu Sans"/>
+              </a:rPr>
+              <a:t>wird aufgefordert die für die Registrierung erforderlichen Daten einzugeben. Sie gibt diese ein </a:t>
+            </a:r>
+            <a:r>
+              <a:rPr lang="de-DE" sz="3000" spc="-1">
+                <a:solidFill>
+                  <a:srgbClr val="000000"/>
+                </a:solidFill>
+                <a:uFill>
+                  <a:solidFill>
+                    <a:srgbClr val="FFFFFF"/>
+                  </a:solidFill>
+                </a:uFill>
+                <a:ea typeface="DejaVu Sans"/>
+              </a:rPr>
+              <a:t>und </a:t>
+            </a:r>
+            <a:r>
+              <a:rPr lang="de-DE" sz="3000" spc="-1" smtClean="0">
+                <a:solidFill>
+                  <a:srgbClr val="000000"/>
+                </a:solidFill>
+                <a:uFill>
+                  <a:solidFill>
+                    <a:srgbClr val="FFFFFF"/>
+                  </a:solidFill>
+                </a:uFill>
+                <a:ea typeface="DejaVu Sans"/>
+              </a:rPr>
+              <a:t>bestätigt </a:t>
+            </a:r>
+            <a:r>
+              <a:rPr lang="de-DE" sz="3000" spc="-1">
+                <a:solidFill>
+                  <a:srgbClr val="000000"/>
+                </a:solidFill>
+                <a:uFill>
+                  <a:solidFill>
+                    <a:srgbClr val="FFFFFF"/>
+                  </a:solidFill>
+                </a:uFill>
+                <a:ea typeface="DejaVu Sans"/>
+              </a:rPr>
+              <a:t>die Übermittlung an den </a:t>
+            </a:r>
+            <a:r>
+              <a:rPr lang="de-DE" sz="3000" spc="-1">
+                <a:solidFill>
+                  <a:srgbClr val="000000"/>
+                </a:solidFill>
+                <a:uFill>
+                  <a:solidFill>
+                    <a:srgbClr val="FFFFFF"/>
+                  </a:solidFill>
+                </a:uFill>
+                <a:ea typeface="DejaVu Sans"/>
+              </a:rPr>
+              <a:t>Server</a:t>
+            </a:r>
+            <a:r>
+              <a:rPr lang="de-DE" sz="3000" spc="-1" smtClean="0">
+                <a:solidFill>
+                  <a:srgbClr val="000000"/>
+                </a:solidFill>
+                <a:uFill>
+                  <a:solidFill>
+                    <a:srgbClr val="FFFFFF"/>
+                  </a:solidFill>
+                </a:uFill>
+                <a:ea typeface="DejaVu Sans"/>
+              </a:rPr>
+              <a:t>.</a:t>
+            </a:r>
+            <a:endParaRPr lang="de-DE" sz="3000" spc="-1" smtClean="0">
+              <a:solidFill>
+                <a:srgbClr val="000000"/>
+              </a:solidFill>
+              <a:uFill>
+                <a:solidFill>
+                  <a:srgbClr val="FFFFFF"/>
+                </a:solidFill>
+              </a:uFill>
+            </a:endParaRPr>
+          </a:p>
+          <a:p>
+            <a:pPr marL="432000" indent="-323280">
+              <a:lnSpc>
+                <a:spcPct val="115000"/>
+              </a:lnSpc>
+              <a:buClr>
+                <a:srgbClr val="000000"/>
+              </a:buClr>
+              <a:buSzPct val="45000"/>
+              <a:buFont typeface="Wingdings" charset="2"/>
+              <a:buChar char=""/>
+            </a:pPr>
+            <a:r>
+              <a:rPr lang="de-DE" spc="-1" smtClean="0">
+                <a:solidFill>
+                  <a:srgbClr val="000000"/>
+                </a:solidFill>
+                <a:uFill>
+                  <a:solidFill>
+                    <a:srgbClr val="FFFFFF"/>
+                  </a:solidFill>
+                </a:uFill>
+                <a:ea typeface="DejaVu Sans"/>
+              </a:rPr>
+              <a:t>Der </a:t>
+            </a:r>
+            <a:r>
+              <a:rPr lang="de-DE" spc="-1">
+                <a:solidFill>
+                  <a:srgbClr val="000000"/>
+                </a:solidFill>
+                <a:uFill>
+                  <a:solidFill>
+                    <a:srgbClr val="FFFFFF"/>
+                  </a:solidFill>
+                </a:uFill>
+                <a:ea typeface="DejaVu Sans"/>
+              </a:rPr>
+              <a:t>Server speichert die Eingaben in der Datenbank und meldet die erfolgreiche Registrierung zurück.</a:t>
+            </a:r>
+            <a:endParaRPr lang="de-DE" spc="-1">
+              <a:solidFill>
+                <a:srgbClr val="000000"/>
+              </a:solidFill>
+              <a:uFill>
+                <a:solidFill>
+                  <a:srgbClr val="FFFFFF"/>
+                </a:solidFill>
+              </a:uFill>
+            </a:endParaRPr>
+          </a:p>
+          <a:p>
+            <a:pPr marL="432000" indent="-323280">
+              <a:lnSpc>
+                <a:spcPct val="115000"/>
+              </a:lnSpc>
+              <a:buClr>
+                <a:srgbClr val="000000"/>
+              </a:buClr>
+              <a:buSzPct val="45000"/>
+              <a:buFont typeface="Wingdings" charset="2"/>
+              <a:buChar char=""/>
+            </a:pPr>
+            <a:endParaRPr lang="de-DE" sz="1800" spc="-1">
+              <a:solidFill>
+                <a:srgbClr val="000000"/>
+              </a:solidFill>
+              <a:uFill>
+                <a:solidFill>
+                  <a:srgbClr val="FFFFFF"/>
+                </a:solidFill>
+              </a:uFill>
+            </a:endParaRPr>
+          </a:p>
+        </p:txBody>
+      </p:sp>
+    </p:spTree>
+    <p:extLst>
+      <p:ext uri="{BB962C8B-B14F-4D97-AF65-F5344CB8AC3E}">
+        <p14:creationId xmlns:p14="http://schemas.microsoft.com/office/powerpoint/2010/main" val="3808311617"/>
+      </p:ext>
+    </p:extLst>
+  </p:cSld>
+  <p:clrMapOvr>
+    <a:masterClrMapping/>
+  </p:clrMapOvr>
+</p:sld>
+</file>
+
+<file path=ppt/slides/slide11.xml><?xml version="1.0" encoding="utf-8"?>
+<p:sld xmlns:a="http://schemas.openxmlformats.org/drawingml/2006/main" xmlns:r="http://schemas.openxmlformats.org/officeDocument/2006/relationships" xmlns:p="http://schemas.openxmlformats.org/presentationml/2006/main">
+  <p:cSld>
+    <p:spTree>
+      <p:nvGrpSpPr>
+        <p:cNvPr id="1" name=""/>
+        <p:cNvGrpSpPr/>
+        <p:nvPr/>
+      </p:nvGrpSpPr>
+      <p:grpSpPr>
+        <a:xfrm>
+          <a:off x="0" y="0"/>
+          <a:ext cx="0" cy="0"/>
+          <a:chOff x="0" y="0"/>
+          <a:chExt cx="0" cy="0"/>
+        </a:xfrm>
+      </p:grpSpPr>
+      <p:sp>
+        <p:nvSpPr>
+          <p:cNvPr id="2" name="Titel 1"/>
+          <p:cNvSpPr>
+            <a:spLocks noGrp="1"/>
+          </p:cNvSpPr>
+          <p:nvPr>
+            <p:ph type="title"/>
+          </p:nvPr>
+        </p:nvSpPr>
+        <p:spPr/>
+        <p:txBody>
+          <a:bodyPr/>
+          <a:lstStyle/>
+          <a:p>
+            <a:r>
+              <a:rPr lang="de-DE" smtClean="0"/>
+              <a:t>Registrierung – Was alles schief gehen könnte</a:t>
+            </a:r>
+            <a:endParaRPr lang="de-DE"/>
+          </a:p>
+        </p:txBody>
+      </p:sp>
+      <p:sp>
+        <p:nvSpPr>
+          <p:cNvPr id="4" name="CustomShape 2"/>
+          <p:cNvSpPr/>
+          <p:nvPr/>
+        </p:nvSpPr>
+        <p:spPr>
+          <a:xfrm>
+            <a:off x="838080" y="1825560"/>
+            <a:ext cx="5130360" cy="4350240"/>
+          </a:xfrm>
+          <a:prstGeom prst="rect">
+            <a:avLst/>
+          </a:prstGeom>
+          <a:noFill/>
+          <a:ln>
+            <a:noFill/>
+          </a:ln>
+        </p:spPr>
+        <p:style>
+          <a:lnRef idx="0">
+            <a:scrgbClr r="0" g="0" b="0"/>
+          </a:lnRef>
+          <a:fillRef idx="0">
+            <a:scrgbClr r="0" g="0" b="0"/>
+          </a:fillRef>
+          <a:effectRef idx="0">
+            <a:scrgbClr r="0" g="0" b="0"/>
+          </a:effectRef>
+          <a:fontRef idx="minor"/>
+        </p:style>
+        <p:txBody>
+          <a:bodyPr lIns="0" tIns="0" rIns="0" bIns="0"/>
+          <a:lstStyle/>
+          <a:p>
+            <a:pPr marL="432000" indent="-323280">
+              <a:lnSpc>
+                <a:spcPct val="100000"/>
+              </a:lnSpc>
+              <a:buClr>
+                <a:srgbClr val="000000"/>
+              </a:buClr>
+              <a:buSzPct val="45000"/>
+              <a:buFont typeface="Wingdings" charset="2"/>
+              <a:buChar char=""/>
+            </a:pPr>
+            <a:r>
+              <a:rPr lang="de-DE" sz="2200" b="0" strike="noStrike" spc="-1" smtClean="0">
+                <a:solidFill>
+                  <a:srgbClr val="000000"/>
+                </a:solidFill>
+                <a:uFill>
+                  <a:solidFill>
+                    <a:srgbClr val="FFFFFF"/>
+                  </a:solidFill>
+                </a:uFill>
+                <a:ea typeface="DejaVu Sans"/>
+              </a:rPr>
+              <a:t>Die </a:t>
+            </a:r>
+            <a:r>
+              <a:rPr lang="de-DE" sz="2200" b="0" strike="noStrike" spc="-1">
+                <a:solidFill>
+                  <a:srgbClr val="000000"/>
+                </a:solidFill>
+                <a:uFill>
+                  <a:solidFill>
+                    <a:srgbClr val="FFFFFF"/>
+                  </a:solidFill>
+                </a:uFill>
+                <a:ea typeface="DejaVu Sans"/>
+              </a:rPr>
+              <a:t>App ist für das verwendete OS </a:t>
+            </a:r>
+            <a:r>
+              <a:rPr lang="de-DE" sz="2200" b="1" strike="noStrike" spc="-1">
+                <a:solidFill>
+                  <a:srgbClr val="000000"/>
+                </a:solidFill>
+                <a:uFill>
+                  <a:solidFill>
+                    <a:srgbClr val="FFFFFF"/>
+                  </a:solidFill>
+                </a:uFill>
+                <a:ea typeface="DejaVu Sans"/>
+              </a:rPr>
+              <a:t>nicht </a:t>
+            </a:r>
+            <a:r>
+              <a:rPr lang="de-DE" sz="2200" b="1" strike="noStrike" spc="-1" smtClean="0">
+                <a:solidFill>
+                  <a:srgbClr val="000000"/>
+                </a:solidFill>
+                <a:uFill>
+                  <a:solidFill>
+                    <a:srgbClr val="FFFFFF"/>
+                  </a:solidFill>
+                </a:uFill>
+                <a:ea typeface="DejaVu Sans"/>
+              </a:rPr>
+              <a:t>verfü̈</a:t>
+            </a:r>
+            <a:r>
+              <a:rPr lang="de-DE" sz="2200" b="1" strike="noStrike" spc="-1">
+                <a:solidFill>
+                  <a:srgbClr val="000000"/>
+                </a:solidFill>
+                <a:uFill>
+                  <a:solidFill>
+                    <a:srgbClr val="FFFFFF"/>
+                  </a:solidFill>
+                </a:uFill>
+                <a:ea typeface="DejaVu Sans"/>
+              </a:rPr>
+              <a:t>gbar</a:t>
+            </a:r>
+            <a:r>
+              <a:rPr lang="de-DE" sz="2200" b="0" strike="noStrike" spc="-1">
+                <a:solidFill>
+                  <a:srgbClr val="000000"/>
+                </a:solidFill>
+                <a:uFill>
+                  <a:solidFill>
+                    <a:srgbClr val="FFFFFF"/>
+                  </a:solidFill>
+                </a:uFill>
+                <a:ea typeface="DejaVu Sans"/>
+              </a:rPr>
+              <a:t>.</a:t>
+            </a:r>
+            <a:endParaRPr lang="de-DE" sz="2200" b="0" strike="noStrike" spc="-1">
+              <a:solidFill>
+                <a:srgbClr val="000000"/>
+              </a:solidFill>
+              <a:uFill>
+                <a:solidFill>
+                  <a:srgbClr val="FFFFFF"/>
+                </a:solidFill>
+              </a:uFill>
+            </a:endParaRPr>
+          </a:p>
+          <a:p>
+            <a:pPr marL="432000" indent="-323280">
+              <a:lnSpc>
+                <a:spcPct val="100000"/>
+              </a:lnSpc>
+              <a:buClr>
+                <a:srgbClr val="000000"/>
+              </a:buClr>
+              <a:buSzPct val="45000"/>
+              <a:buFont typeface="Wingdings" charset="2"/>
+              <a:buChar char=""/>
+            </a:pPr>
+            <a:r>
+              <a:rPr lang="de-DE" sz="2200" b="0" strike="noStrike" spc="-1" smtClean="0">
+                <a:solidFill>
+                  <a:srgbClr val="000000"/>
+                </a:solidFill>
+                <a:uFill>
+                  <a:solidFill>
+                    <a:srgbClr val="FFFFFF"/>
+                  </a:solidFill>
+                </a:uFill>
+                <a:ea typeface="DejaVu Sans"/>
+              </a:rPr>
+              <a:t>Die </a:t>
+            </a:r>
+            <a:r>
+              <a:rPr lang="de-DE" sz="2200" b="0" strike="noStrike" spc="-1">
+                <a:solidFill>
+                  <a:srgbClr val="000000"/>
+                </a:solidFill>
+                <a:uFill>
+                  <a:solidFill>
+                    <a:srgbClr val="FFFFFF"/>
+                  </a:solidFill>
+                </a:uFill>
+                <a:ea typeface="DejaVu Sans"/>
+              </a:rPr>
+              <a:t>App ist zwar verfügbar, </a:t>
+            </a:r>
+            <a:r>
+              <a:rPr lang="de-DE" sz="2200" b="1" strike="noStrike" spc="-1" smtClean="0">
+                <a:solidFill>
+                  <a:srgbClr val="000000"/>
+                </a:solidFill>
+                <a:uFill>
+                  <a:solidFill>
+                    <a:srgbClr val="FFFFFF"/>
+                  </a:solidFill>
+                </a:uFill>
+                <a:ea typeface="DejaVu Sans"/>
+              </a:rPr>
+              <a:t>lä̈</a:t>
+            </a:r>
+            <a:r>
+              <a:rPr lang="de-DE" sz="2200" b="1" strike="noStrike" spc="-1">
+                <a:solidFill>
+                  <a:srgbClr val="000000"/>
+                </a:solidFill>
+                <a:uFill>
+                  <a:solidFill>
+                    <a:srgbClr val="FFFFFF"/>
+                  </a:solidFill>
+                </a:uFill>
+                <a:ea typeface="DejaVu Sans"/>
+              </a:rPr>
+              <a:t>uft</a:t>
+            </a:r>
+            <a:r>
+              <a:rPr lang="de-DE" sz="2200" b="0" strike="noStrike" spc="-1">
+                <a:solidFill>
+                  <a:srgbClr val="000000"/>
+                </a:solidFill>
+                <a:uFill>
+                  <a:solidFill>
+                    <a:srgbClr val="FFFFFF"/>
+                  </a:solidFill>
+                </a:uFill>
+                <a:ea typeface="DejaVu Sans"/>
+              </a:rPr>
+              <a:t> aber auf dem verwendeten System </a:t>
+            </a:r>
+            <a:r>
+              <a:rPr lang="de-DE" sz="2200" b="1" strike="noStrike" spc="-1">
+                <a:solidFill>
+                  <a:srgbClr val="000000"/>
+                </a:solidFill>
+                <a:uFill>
+                  <a:solidFill>
+                    <a:srgbClr val="FFFFFF"/>
+                  </a:solidFill>
+                </a:uFill>
+                <a:ea typeface="DejaVu Sans"/>
+              </a:rPr>
+              <a:t>nicht</a:t>
+            </a:r>
+            <a:r>
+              <a:rPr lang="de-DE" sz="2200" b="0" strike="noStrike" spc="-1">
+                <a:solidFill>
+                  <a:srgbClr val="000000"/>
+                </a:solidFill>
+                <a:uFill>
+                  <a:solidFill>
+                    <a:srgbClr val="FFFFFF"/>
+                  </a:solidFill>
+                </a:uFill>
+                <a:ea typeface="DejaVu Sans"/>
+              </a:rPr>
+              <a:t>.</a:t>
+            </a:r>
+            <a:endParaRPr lang="de-DE" sz="2200" b="0" strike="noStrike" spc="-1">
+              <a:solidFill>
+                <a:srgbClr val="000000"/>
+              </a:solidFill>
+              <a:uFill>
+                <a:solidFill>
+                  <a:srgbClr val="FFFFFF"/>
+                </a:solidFill>
+              </a:uFill>
+            </a:endParaRPr>
+          </a:p>
+          <a:p>
+            <a:pPr marL="432000" indent="-323280">
+              <a:lnSpc>
+                <a:spcPct val="100000"/>
+              </a:lnSpc>
+              <a:buClr>
+                <a:srgbClr val="000000"/>
+              </a:buClr>
+              <a:buSzPct val="45000"/>
+              <a:buFont typeface="Wingdings" charset="2"/>
+              <a:buChar char=""/>
+            </a:pPr>
+            <a:r>
+              <a:rPr lang="de-DE" sz="2200" b="0" strike="noStrike" spc="-1" smtClean="0">
+                <a:solidFill>
+                  <a:srgbClr val="000000"/>
+                </a:solidFill>
+                <a:uFill>
+                  <a:solidFill>
+                    <a:srgbClr val="FFFFFF"/>
+                  </a:solidFill>
+                </a:uFill>
+                <a:ea typeface="DejaVu Sans"/>
+              </a:rPr>
+              <a:t>Die </a:t>
+            </a:r>
+            <a:r>
+              <a:rPr lang="de-DE" sz="2200" b="0" strike="noStrike" spc="-1">
+                <a:solidFill>
+                  <a:srgbClr val="000000"/>
+                </a:solidFill>
+                <a:uFill>
+                  <a:solidFill>
+                    <a:srgbClr val="FFFFFF"/>
+                  </a:solidFill>
+                </a:uFill>
+                <a:ea typeface="DejaVu Sans"/>
+              </a:rPr>
+              <a:t>App </a:t>
+            </a:r>
+            <a:r>
+              <a:rPr lang="de-DE" sz="2200" b="0" strike="noStrike" spc="-1" smtClean="0">
+                <a:solidFill>
+                  <a:srgbClr val="000000"/>
+                </a:solidFill>
+                <a:uFill>
+                  <a:solidFill>
+                    <a:srgbClr val="FFFFFF"/>
+                  </a:solidFill>
+                </a:uFill>
+                <a:ea typeface="DejaVu Sans"/>
+              </a:rPr>
+              <a:t>läuft </a:t>
+            </a:r>
+            <a:r>
+              <a:rPr lang="de-DE" sz="2200" b="1" strike="noStrike" spc="-1">
+                <a:solidFill>
+                  <a:srgbClr val="000000"/>
+                </a:solidFill>
+                <a:uFill>
+                  <a:solidFill>
+                    <a:srgbClr val="FFFFFF"/>
+                  </a:solidFill>
+                </a:uFill>
+                <a:ea typeface="DejaVu Sans"/>
+              </a:rPr>
+              <a:t>unbrauchbar langsam</a:t>
+            </a:r>
+            <a:r>
+              <a:rPr lang="de-DE" sz="2200" b="0" strike="noStrike" spc="-1">
+                <a:solidFill>
+                  <a:srgbClr val="000000"/>
+                </a:solidFill>
+                <a:uFill>
+                  <a:solidFill>
+                    <a:srgbClr val="FFFFFF"/>
+                  </a:solidFill>
+                </a:uFill>
+                <a:ea typeface="DejaVu Sans"/>
+              </a:rPr>
+              <a:t>.</a:t>
+            </a:r>
+            <a:endParaRPr lang="de-DE" sz="2200" b="0" strike="noStrike" spc="-1">
+              <a:solidFill>
+                <a:srgbClr val="000000"/>
+              </a:solidFill>
+              <a:uFill>
+                <a:solidFill>
+                  <a:srgbClr val="FFFFFF"/>
+                </a:solidFill>
+              </a:uFill>
+            </a:endParaRPr>
+          </a:p>
+          <a:p>
+            <a:pPr marL="432000" indent="-323280">
+              <a:lnSpc>
+                <a:spcPct val="100000"/>
+              </a:lnSpc>
+              <a:buClr>
+                <a:srgbClr val="000000"/>
+              </a:buClr>
+              <a:buSzPct val="45000"/>
+              <a:buFont typeface="Wingdings" charset="2"/>
+              <a:buChar char=""/>
+            </a:pPr>
+            <a:r>
+              <a:rPr lang="de-DE" sz="2200" b="0" strike="noStrike" spc="-1" smtClean="0">
+                <a:solidFill>
+                  <a:srgbClr val="000000"/>
+                </a:solidFill>
+                <a:uFill>
+                  <a:solidFill>
+                    <a:srgbClr val="FFFFFF"/>
+                  </a:solidFill>
+                </a:uFill>
+                <a:ea typeface="DejaVu Sans"/>
+              </a:rPr>
+              <a:t>Es </a:t>
+            </a:r>
+            <a:r>
+              <a:rPr lang="de-DE" sz="2200" b="0" strike="noStrike" spc="-1">
+                <a:solidFill>
+                  <a:srgbClr val="000000"/>
+                </a:solidFill>
+                <a:uFill>
+                  <a:solidFill>
+                    <a:srgbClr val="FFFFFF"/>
+                  </a:solidFill>
+                </a:uFill>
+                <a:ea typeface="DejaVu Sans"/>
+              </a:rPr>
+              <a:t>ist </a:t>
+            </a:r>
+            <a:r>
+              <a:rPr lang="de-DE" sz="2200" b="1" strike="noStrike" spc="-1">
+                <a:solidFill>
+                  <a:srgbClr val="000000"/>
+                </a:solidFill>
+                <a:uFill>
+                  <a:solidFill>
+                    <a:srgbClr val="FFFFFF"/>
+                  </a:solidFill>
+                </a:uFill>
+                <a:ea typeface="DejaVu Sans"/>
+              </a:rPr>
+              <a:t>keine Verbindung </a:t>
+            </a:r>
+            <a:r>
+              <a:rPr lang="de-DE" sz="2200" b="0" strike="noStrike" spc="-1">
+                <a:solidFill>
+                  <a:srgbClr val="000000"/>
+                </a:solidFill>
+                <a:uFill>
+                  <a:solidFill>
+                    <a:srgbClr val="FFFFFF"/>
+                  </a:solidFill>
+                </a:uFill>
+                <a:ea typeface="DejaVu Sans"/>
+              </a:rPr>
+              <a:t>zum Server möglich.</a:t>
+            </a:r>
+            <a:endParaRPr lang="de-DE" sz="2200" b="0" strike="noStrike" spc="-1">
+              <a:solidFill>
+                <a:srgbClr val="000000"/>
+              </a:solidFill>
+              <a:uFill>
+                <a:solidFill>
+                  <a:srgbClr val="FFFFFF"/>
+                </a:solidFill>
+              </a:uFill>
+            </a:endParaRPr>
+          </a:p>
+          <a:p>
+            <a:pPr marL="432000" indent="-323280">
+              <a:lnSpc>
+                <a:spcPct val="100000"/>
+              </a:lnSpc>
+              <a:buClr>
+                <a:srgbClr val="000000"/>
+              </a:buClr>
+              <a:buSzPct val="45000"/>
+              <a:buFont typeface="Wingdings" charset="2"/>
+              <a:buChar char=""/>
+            </a:pPr>
+            <a:r>
+              <a:rPr lang="de-DE" sz="2200" b="0" strike="noStrike" spc="-1" smtClean="0">
+                <a:solidFill>
+                  <a:srgbClr val="000000"/>
+                </a:solidFill>
+                <a:uFill>
+                  <a:solidFill>
+                    <a:srgbClr val="FFFFFF"/>
+                  </a:solidFill>
+                </a:uFill>
+                <a:ea typeface="DejaVu Sans"/>
+              </a:rPr>
+              <a:t>Der Server ist </a:t>
+            </a:r>
+            <a:r>
+              <a:rPr lang="de-DE" sz="2200" b="1" strike="noStrike" spc="-1" smtClean="0">
+                <a:solidFill>
+                  <a:srgbClr val="000000"/>
+                </a:solidFill>
+                <a:uFill>
+                  <a:solidFill>
+                    <a:srgbClr val="FFFFFF"/>
+                  </a:solidFill>
+                </a:uFill>
+                <a:ea typeface="DejaVu Sans"/>
+              </a:rPr>
+              <a:t>überlastet</a:t>
+            </a:r>
+            <a:r>
+              <a:rPr lang="de-DE" sz="2200" b="0" strike="noStrike" spc="-1">
+                <a:solidFill>
+                  <a:srgbClr val="000000"/>
+                </a:solidFill>
+                <a:uFill>
+                  <a:solidFill>
+                    <a:srgbClr val="FFFFFF"/>
+                  </a:solidFill>
+                </a:uFill>
+                <a:ea typeface="DejaVu Sans"/>
+              </a:rPr>
+              <a:t>.</a:t>
+            </a:r>
+            <a:endParaRPr lang="de-DE" sz="2200" b="0" strike="noStrike" spc="-1">
+              <a:solidFill>
+                <a:srgbClr val="000000"/>
+              </a:solidFill>
+              <a:uFill>
+                <a:solidFill>
+                  <a:srgbClr val="FFFFFF"/>
+                </a:solidFill>
+              </a:uFill>
+            </a:endParaRPr>
+          </a:p>
+          <a:p>
+            <a:pPr marL="432000" indent="-323280">
+              <a:lnSpc>
+                <a:spcPct val="100000"/>
+              </a:lnSpc>
+              <a:buClr>
+                <a:srgbClr val="000000"/>
+              </a:buClr>
+              <a:buSzPct val="45000"/>
+              <a:buFont typeface="Wingdings" charset="2"/>
+              <a:buChar char=""/>
+            </a:pPr>
+            <a:r>
+              <a:rPr lang="de-DE" sz="2200" b="0" strike="noStrike" spc="-1" smtClean="0">
+                <a:solidFill>
+                  <a:srgbClr val="000000"/>
+                </a:solidFill>
+                <a:uFill>
+                  <a:solidFill>
+                    <a:srgbClr val="FFFFFF"/>
+                  </a:solidFill>
+                </a:uFill>
+                <a:ea typeface="DejaVu Sans"/>
+              </a:rPr>
+              <a:t>Ein </a:t>
+            </a:r>
+            <a:r>
+              <a:rPr lang="de-DE" sz="2200" b="0" strike="noStrike" spc="-1">
+                <a:solidFill>
+                  <a:srgbClr val="000000"/>
+                </a:solidFill>
+                <a:uFill>
+                  <a:solidFill>
+                    <a:srgbClr val="FFFFFF"/>
+                  </a:solidFill>
+                </a:uFill>
+                <a:ea typeface="DejaVu Sans"/>
+              </a:rPr>
+              <a:t>frei </a:t>
+            </a:r>
+            <a:r>
+              <a:rPr lang="de-DE" sz="2200" b="0" strike="noStrike" spc="-1" smtClean="0">
+                <a:solidFill>
+                  <a:srgbClr val="000000"/>
+                </a:solidFill>
+                <a:uFill>
+                  <a:solidFill>
+                    <a:srgbClr val="FFFFFF"/>
+                  </a:solidFill>
+                </a:uFill>
+                <a:ea typeface="DejaVu Sans"/>
+              </a:rPr>
+              <a:t>wä̈</a:t>
+            </a:r>
+            <a:r>
+              <a:rPr lang="de-DE" sz="2200" b="0" strike="noStrike" spc="-1">
+                <a:solidFill>
+                  <a:srgbClr val="000000"/>
+                </a:solidFill>
+                <a:uFill>
+                  <a:solidFill>
+                    <a:srgbClr val="FFFFFF"/>
+                  </a:solidFill>
+                </a:uFill>
+                <a:ea typeface="DejaVu Sans"/>
+              </a:rPr>
+              <a:t>hlbarer </a:t>
+            </a:r>
+            <a:r>
+              <a:rPr lang="de-DE" sz="2200" b="1" strike="noStrike" spc="-1">
+                <a:solidFill>
+                  <a:srgbClr val="000000"/>
+                </a:solidFill>
+                <a:uFill>
+                  <a:solidFill>
+                    <a:srgbClr val="FFFFFF"/>
+                  </a:solidFill>
+                </a:uFill>
+                <a:ea typeface="DejaVu Sans"/>
+              </a:rPr>
+              <a:t>Bezeichner</a:t>
+            </a:r>
+            <a:r>
+              <a:rPr lang="de-DE" sz="2200" b="0" strike="noStrike" spc="-1">
+                <a:solidFill>
+                  <a:srgbClr val="000000"/>
+                </a:solidFill>
+                <a:uFill>
+                  <a:solidFill>
+                    <a:srgbClr val="FFFFFF"/>
+                  </a:solidFill>
+                </a:uFill>
+                <a:ea typeface="DejaVu Sans"/>
+              </a:rPr>
+              <a:t>, der als </a:t>
+            </a:r>
+            <a:r>
+              <a:rPr lang="de-DE" sz="2200" b="0" strike="noStrike" spc="-1" smtClean="0">
+                <a:solidFill>
+                  <a:srgbClr val="000000"/>
+                </a:solidFill>
+                <a:uFill>
+                  <a:solidFill>
+                    <a:srgbClr val="FFFFFF"/>
+                  </a:solidFill>
+                </a:uFill>
+                <a:ea typeface="DejaVu Sans"/>
+              </a:rPr>
+              <a:t>Schlü̈</a:t>
+            </a:r>
+            <a:r>
+              <a:rPr lang="de-DE" sz="2200" b="0" strike="noStrike" spc="-1">
+                <a:solidFill>
+                  <a:srgbClr val="000000"/>
+                </a:solidFill>
+                <a:uFill>
+                  <a:solidFill>
+                    <a:srgbClr val="FFFFFF"/>
+                  </a:solidFill>
+                </a:uFill>
+                <a:ea typeface="DejaVu Sans"/>
+              </a:rPr>
+              <a:t>ssel für die Datenbank verwendet wird, ist schon </a:t>
+            </a:r>
+            <a:r>
+              <a:rPr lang="de-DE" sz="2200" b="1" strike="noStrike" spc="-1">
+                <a:solidFill>
+                  <a:srgbClr val="000000"/>
+                </a:solidFill>
+                <a:uFill>
+                  <a:solidFill>
+                    <a:srgbClr val="FFFFFF"/>
+                  </a:solidFill>
+                </a:uFill>
+                <a:ea typeface="DejaVu Sans"/>
+              </a:rPr>
+              <a:t>belegt</a:t>
+            </a:r>
+            <a:r>
+              <a:rPr lang="de-DE" sz="2200" b="0" strike="noStrike" spc="-1">
+                <a:solidFill>
+                  <a:srgbClr val="000000"/>
+                </a:solidFill>
+                <a:uFill>
+                  <a:solidFill>
+                    <a:srgbClr val="FFFFFF"/>
+                  </a:solidFill>
+                </a:uFill>
+                <a:ea typeface="DejaVu Sans"/>
+              </a:rPr>
+              <a:t>.</a:t>
+            </a:r>
+            <a:endParaRPr lang="de-DE" sz="2200" b="0" strike="noStrike" spc="-1">
+              <a:solidFill>
+                <a:srgbClr val="000000"/>
+              </a:solidFill>
+              <a:uFill>
+                <a:solidFill>
+                  <a:srgbClr val="FFFFFF"/>
+                </a:solidFill>
+              </a:uFill>
+            </a:endParaRPr>
+          </a:p>
+        </p:txBody>
+      </p:sp>
+      <p:sp>
+        <p:nvSpPr>
+          <p:cNvPr id="5" name="CustomShape 3"/>
+          <p:cNvSpPr/>
+          <p:nvPr/>
+        </p:nvSpPr>
+        <p:spPr>
+          <a:xfrm>
+            <a:off x="6226200" y="1689840"/>
+            <a:ext cx="5130360" cy="4350240"/>
+          </a:xfrm>
+          <a:prstGeom prst="rect">
+            <a:avLst/>
+          </a:prstGeom>
+          <a:noFill/>
+          <a:ln>
+            <a:noFill/>
+          </a:ln>
+        </p:spPr>
+        <p:style>
+          <a:lnRef idx="0">
+            <a:scrgbClr r="0" g="0" b="0"/>
+          </a:lnRef>
+          <a:fillRef idx="0">
+            <a:scrgbClr r="0" g="0" b="0"/>
+          </a:fillRef>
+          <a:effectRef idx="0">
+            <a:scrgbClr r="0" g="0" b="0"/>
+          </a:effectRef>
+          <a:fontRef idx="minor"/>
+        </p:style>
+        <p:txBody>
+          <a:bodyPr lIns="0" tIns="0" rIns="0" bIns="0"/>
+          <a:lstStyle/>
+          <a:p>
+            <a:pPr marL="432000" indent="-323280">
+              <a:lnSpc>
+                <a:spcPct val="100000"/>
+              </a:lnSpc>
+              <a:buClr>
+                <a:srgbClr val="000000"/>
+              </a:buClr>
+              <a:buSzPct val="45000"/>
+              <a:buFont typeface="Wingdings" charset="2"/>
+              <a:buChar char=""/>
+            </a:pPr>
+            <a:r>
+              <a:rPr lang="de-DE" sz="2200" b="0" strike="noStrike" spc="-1" smtClean="0">
+                <a:solidFill>
+                  <a:srgbClr val="000000"/>
+                </a:solidFill>
+                <a:uFill>
+                  <a:solidFill>
+                    <a:srgbClr val="FFFFFF"/>
+                  </a:solidFill>
+                </a:uFill>
+                <a:ea typeface="DejaVu Sans"/>
+              </a:rPr>
+              <a:t>Der </a:t>
+            </a:r>
+            <a:r>
+              <a:rPr lang="de-DE" sz="2200" b="0" strike="noStrike" spc="-1">
+                <a:solidFill>
+                  <a:srgbClr val="000000"/>
+                </a:solidFill>
+                <a:uFill>
+                  <a:solidFill>
+                    <a:srgbClr val="FFFFFF"/>
+                  </a:solidFill>
+                </a:uFill>
+                <a:ea typeface="DejaVu Sans"/>
+              </a:rPr>
+              <a:t>User </a:t>
+            </a:r>
+            <a:r>
+              <a:rPr lang="de-DE" sz="2200" b="1" strike="noStrike" spc="-1">
+                <a:solidFill>
+                  <a:srgbClr val="000000"/>
+                </a:solidFill>
+                <a:uFill>
+                  <a:solidFill>
+                    <a:srgbClr val="FFFFFF"/>
+                  </a:solidFill>
+                </a:uFill>
+                <a:ea typeface="DejaVu Sans"/>
+              </a:rPr>
+              <a:t>scheitert</a:t>
+            </a:r>
+            <a:r>
+              <a:rPr lang="de-DE" sz="2200" b="0" strike="noStrike" spc="-1">
+                <a:solidFill>
+                  <a:srgbClr val="000000"/>
+                </a:solidFill>
+                <a:uFill>
+                  <a:solidFill>
+                    <a:srgbClr val="FFFFFF"/>
+                  </a:solidFill>
+                </a:uFill>
+                <a:ea typeface="DejaVu Sans"/>
+              </a:rPr>
+              <a:t> </a:t>
+            </a:r>
+            <a:r>
+              <a:rPr lang="de-DE" sz="2200" b="1" strike="noStrike" spc="-1">
+                <a:solidFill>
+                  <a:srgbClr val="000000"/>
+                </a:solidFill>
+                <a:uFill>
+                  <a:solidFill>
+                    <a:srgbClr val="FFFFFF"/>
+                  </a:solidFill>
+                </a:uFill>
+                <a:ea typeface="DejaVu Sans"/>
+              </a:rPr>
+              <a:t>an</a:t>
+            </a:r>
+            <a:r>
+              <a:rPr lang="de-DE" sz="2200" b="0" strike="noStrike" spc="-1">
+                <a:solidFill>
+                  <a:srgbClr val="000000"/>
+                </a:solidFill>
+                <a:uFill>
+                  <a:solidFill>
+                    <a:srgbClr val="FFFFFF"/>
+                  </a:solidFill>
+                </a:uFill>
+                <a:ea typeface="DejaVu Sans"/>
+              </a:rPr>
+              <a:t> der </a:t>
+            </a:r>
+            <a:r>
+              <a:rPr lang="de-DE" sz="2200" b="1" strike="noStrike" spc="-1">
+                <a:solidFill>
+                  <a:srgbClr val="000000"/>
+                </a:solidFill>
+                <a:uFill>
+                  <a:solidFill>
+                    <a:srgbClr val="FFFFFF"/>
+                  </a:solidFill>
+                </a:uFill>
+                <a:ea typeface="DejaVu Sans"/>
+              </a:rPr>
+              <a:t>Eingabe</a:t>
+            </a:r>
+            <a:r>
+              <a:rPr lang="de-DE" sz="2200" b="0" strike="noStrike" spc="-1">
+                <a:solidFill>
+                  <a:srgbClr val="000000"/>
+                </a:solidFill>
+                <a:uFill>
+                  <a:solidFill>
+                    <a:srgbClr val="FFFFFF"/>
+                  </a:solidFill>
+                </a:uFill>
+                <a:ea typeface="DejaVu Sans"/>
+              </a:rPr>
+              <a:t> der Daten.</a:t>
+            </a:r>
+            <a:endParaRPr lang="de-DE" sz="2200" b="0" strike="noStrike" spc="-1">
+              <a:solidFill>
+                <a:srgbClr val="000000"/>
+              </a:solidFill>
+              <a:uFill>
+                <a:solidFill>
+                  <a:srgbClr val="FFFFFF"/>
+                </a:solidFill>
+              </a:uFill>
+            </a:endParaRPr>
+          </a:p>
+          <a:p>
+            <a:pPr marL="432000" indent="-323280">
+              <a:lnSpc>
+                <a:spcPct val="100000"/>
+              </a:lnSpc>
+              <a:buClr>
+                <a:srgbClr val="000000"/>
+              </a:buClr>
+              <a:buSzPct val="45000"/>
+              <a:buFont typeface="Wingdings" charset="2"/>
+              <a:buChar char=""/>
+            </a:pPr>
+            <a:r>
+              <a:rPr lang="de-DE" sz="2200" b="0" strike="noStrike" spc="-1" smtClean="0">
+                <a:solidFill>
+                  <a:srgbClr val="000000"/>
+                </a:solidFill>
+                <a:uFill>
+                  <a:solidFill>
+                    <a:srgbClr val="FFFFFF"/>
+                  </a:solidFill>
+                </a:uFill>
+                <a:ea typeface="DejaVu Sans"/>
+              </a:rPr>
+              <a:t>Die </a:t>
+            </a:r>
+            <a:r>
+              <a:rPr lang="de-DE" sz="2200" b="1" spc="-1">
+                <a:solidFill>
+                  <a:srgbClr val="000000"/>
+                </a:solidFill>
+                <a:uFill>
+                  <a:solidFill>
+                    <a:srgbClr val="FFFFFF"/>
+                  </a:solidFill>
+                </a:uFill>
+                <a:ea typeface="DejaVu Sans"/>
+              </a:rPr>
+              <a:t>Ü</a:t>
+            </a:r>
+            <a:r>
+              <a:rPr lang="de-DE" sz="2200" b="1" strike="noStrike" spc="-1" smtClean="0">
+                <a:solidFill>
+                  <a:srgbClr val="000000"/>
+                </a:solidFill>
+                <a:uFill>
+                  <a:solidFill>
+                    <a:srgbClr val="FFFFFF"/>
+                  </a:solidFill>
+                </a:uFill>
+                <a:ea typeface="DejaVu Sans"/>
+              </a:rPr>
+              <a:t>bermittlung</a:t>
+            </a:r>
+            <a:r>
+              <a:rPr lang="de-DE" sz="2200" b="0" strike="noStrike" spc="-1" smtClean="0">
+                <a:solidFill>
+                  <a:srgbClr val="000000"/>
+                </a:solidFill>
+                <a:uFill>
+                  <a:solidFill>
+                    <a:srgbClr val="FFFFFF"/>
+                  </a:solidFill>
+                </a:uFill>
+                <a:ea typeface="DejaVu Sans"/>
+              </a:rPr>
+              <a:t> </a:t>
+            </a:r>
+            <a:r>
+              <a:rPr lang="de-DE" sz="2200" b="0" strike="noStrike" spc="-1">
+                <a:solidFill>
+                  <a:srgbClr val="000000"/>
+                </a:solidFill>
+                <a:uFill>
+                  <a:solidFill>
+                    <a:srgbClr val="FFFFFF"/>
+                  </a:solidFill>
+                </a:uFill>
+                <a:ea typeface="DejaVu Sans"/>
+              </a:rPr>
+              <a:t>der Daten ist unvollständig/wird abgebrochen.</a:t>
+            </a:r>
+            <a:endParaRPr lang="de-DE" sz="2200" b="0" strike="noStrike" spc="-1">
+              <a:solidFill>
+                <a:srgbClr val="000000"/>
+              </a:solidFill>
+              <a:uFill>
+                <a:solidFill>
+                  <a:srgbClr val="FFFFFF"/>
+                </a:solidFill>
+              </a:uFill>
+            </a:endParaRPr>
+          </a:p>
+          <a:p>
+            <a:pPr marL="432000" indent="-323280">
+              <a:lnSpc>
+                <a:spcPct val="100000"/>
+              </a:lnSpc>
+              <a:buClr>
+                <a:srgbClr val="000000"/>
+              </a:buClr>
+              <a:buSzPct val="45000"/>
+              <a:buFont typeface="Wingdings" charset="2"/>
+              <a:buChar char=""/>
+            </a:pPr>
+            <a:r>
+              <a:rPr lang="de-DE" sz="2200" b="0" strike="noStrike" spc="-1" smtClean="0">
+                <a:solidFill>
+                  <a:srgbClr val="000000"/>
+                </a:solidFill>
+                <a:uFill>
+                  <a:solidFill>
+                    <a:srgbClr val="FFFFFF"/>
+                  </a:solidFill>
+                </a:uFill>
+                <a:ea typeface="DejaVu Sans"/>
+              </a:rPr>
+              <a:t>Der </a:t>
+            </a:r>
+            <a:r>
+              <a:rPr lang="de-DE" sz="2200" b="0" strike="noStrike" spc="-1">
+                <a:solidFill>
+                  <a:srgbClr val="000000"/>
+                </a:solidFill>
+                <a:uFill>
+                  <a:solidFill>
+                    <a:srgbClr val="FFFFFF"/>
+                  </a:solidFill>
+                </a:uFill>
+                <a:ea typeface="DejaVu Sans"/>
+              </a:rPr>
+              <a:t>Server </a:t>
+            </a:r>
+            <a:r>
+              <a:rPr lang="de-DE" sz="2200" b="1" strike="noStrike" spc="-1">
+                <a:solidFill>
+                  <a:srgbClr val="000000"/>
+                </a:solidFill>
+                <a:uFill>
+                  <a:solidFill>
+                    <a:srgbClr val="FFFFFF"/>
+                  </a:solidFill>
+                </a:uFill>
+                <a:ea typeface="DejaVu Sans"/>
+              </a:rPr>
+              <a:t>verarbeitet</a:t>
+            </a:r>
+            <a:r>
+              <a:rPr lang="de-DE" sz="2200" b="0" strike="noStrike" spc="-1">
+                <a:solidFill>
+                  <a:srgbClr val="000000"/>
+                </a:solidFill>
+                <a:uFill>
+                  <a:solidFill>
+                    <a:srgbClr val="FFFFFF"/>
+                  </a:solidFill>
+                </a:uFill>
+                <a:ea typeface="DejaVu Sans"/>
+              </a:rPr>
+              <a:t> die Eingabedaten </a:t>
+            </a:r>
+            <a:r>
+              <a:rPr lang="de-DE" sz="2200" b="1" strike="noStrike" spc="-1">
+                <a:solidFill>
+                  <a:srgbClr val="000000"/>
+                </a:solidFill>
+                <a:uFill>
+                  <a:solidFill>
+                    <a:srgbClr val="FFFFFF"/>
+                  </a:solidFill>
+                </a:uFill>
+                <a:ea typeface="DejaVu Sans"/>
+              </a:rPr>
+              <a:t>fehlerhaft</a:t>
+            </a:r>
+            <a:r>
+              <a:rPr lang="de-DE" sz="2200" b="0" strike="noStrike" spc="-1">
+                <a:solidFill>
+                  <a:srgbClr val="000000"/>
+                </a:solidFill>
+                <a:uFill>
+                  <a:solidFill>
+                    <a:srgbClr val="FFFFFF"/>
+                  </a:solidFill>
+                </a:uFill>
+                <a:ea typeface="DejaVu Sans"/>
+              </a:rPr>
+              <a:t>.</a:t>
+            </a:r>
+            <a:endParaRPr lang="de-DE" sz="2200" b="0" strike="noStrike" spc="-1">
+              <a:solidFill>
+                <a:srgbClr val="000000"/>
+              </a:solidFill>
+              <a:uFill>
+                <a:solidFill>
+                  <a:srgbClr val="FFFFFF"/>
+                </a:solidFill>
+              </a:uFill>
+            </a:endParaRPr>
+          </a:p>
+          <a:p>
+            <a:pPr marL="432000" indent="-323280">
+              <a:lnSpc>
+                <a:spcPct val="100000"/>
+              </a:lnSpc>
+              <a:buClr>
+                <a:srgbClr val="000000"/>
+              </a:buClr>
+              <a:buSzPct val="45000"/>
+              <a:buFont typeface="Wingdings" charset="2"/>
+              <a:buChar char=""/>
+            </a:pPr>
+            <a:r>
+              <a:rPr lang="de-DE" sz="2200" b="0" strike="noStrike" spc="-1" smtClean="0">
+                <a:solidFill>
+                  <a:srgbClr val="000000"/>
+                </a:solidFill>
+                <a:uFill>
+                  <a:solidFill>
+                    <a:srgbClr val="FFFFFF"/>
+                  </a:solidFill>
+                </a:uFill>
+                <a:ea typeface="DejaVu Sans"/>
+              </a:rPr>
+              <a:t>Die </a:t>
+            </a:r>
+            <a:r>
+              <a:rPr lang="de-DE" sz="2200" b="0" strike="noStrike" spc="-1">
+                <a:solidFill>
+                  <a:srgbClr val="000000"/>
+                </a:solidFill>
+                <a:uFill>
+                  <a:solidFill>
+                    <a:srgbClr val="FFFFFF"/>
+                  </a:solidFill>
+                </a:uFill>
+                <a:ea typeface="DejaVu Sans"/>
+              </a:rPr>
+              <a:t>erfolgreiche Registrierung mit Eintrag in die Datenbank kann nicht </a:t>
+            </a:r>
+            <a:r>
+              <a:rPr lang="de-DE" sz="2200" spc="-1" smtClean="0">
+                <a:solidFill>
+                  <a:srgbClr val="000000"/>
+                </a:solidFill>
+                <a:uFill>
+                  <a:solidFill>
+                    <a:srgbClr val="FFFFFF"/>
+                  </a:solidFill>
+                </a:uFill>
+                <a:ea typeface="DejaVu Sans"/>
+              </a:rPr>
+              <a:t>ü</a:t>
+            </a:r>
+            <a:r>
+              <a:rPr lang="de-DE" sz="2200" b="0" strike="noStrike" spc="-1" smtClean="0">
+                <a:solidFill>
+                  <a:srgbClr val="000000"/>
+                </a:solidFill>
+                <a:uFill>
+                  <a:solidFill>
+                    <a:srgbClr val="FFFFFF"/>
+                  </a:solidFill>
+                </a:uFill>
+                <a:ea typeface="DejaVu Sans"/>
+              </a:rPr>
+              <a:t>bermittelt </a:t>
+            </a:r>
+            <a:r>
+              <a:rPr lang="de-DE" sz="2200" b="0" strike="noStrike" spc="-1">
+                <a:solidFill>
+                  <a:srgbClr val="000000"/>
+                </a:solidFill>
+                <a:uFill>
+                  <a:solidFill>
+                    <a:srgbClr val="FFFFFF"/>
+                  </a:solidFill>
+                </a:uFill>
+                <a:ea typeface="DejaVu Sans"/>
+              </a:rPr>
+              <a:t>werden, weil die </a:t>
+            </a:r>
+            <a:r>
+              <a:rPr lang="de-DE" sz="2200" b="1" strike="noStrike" spc="-1">
+                <a:solidFill>
+                  <a:srgbClr val="000000"/>
+                </a:solidFill>
+                <a:uFill>
+                  <a:solidFill>
+                    <a:srgbClr val="FFFFFF"/>
+                  </a:solidFill>
+                </a:uFill>
+                <a:ea typeface="DejaVu Sans"/>
+              </a:rPr>
+              <a:t>Internetverbindung</a:t>
+            </a:r>
+            <a:r>
+              <a:rPr lang="de-DE" sz="2200" b="0" strike="noStrike" spc="-1">
+                <a:solidFill>
+                  <a:srgbClr val="000000"/>
+                </a:solidFill>
+                <a:uFill>
+                  <a:solidFill>
+                    <a:srgbClr val="FFFFFF"/>
+                  </a:solidFill>
+                </a:uFill>
+                <a:ea typeface="DejaVu Sans"/>
+              </a:rPr>
+              <a:t> zwischenzeitlich </a:t>
+            </a:r>
+            <a:r>
+              <a:rPr lang="de-DE" sz="2200" b="1" strike="noStrike" spc="-1">
+                <a:solidFill>
+                  <a:srgbClr val="000000"/>
+                </a:solidFill>
+                <a:uFill>
+                  <a:solidFill>
+                    <a:srgbClr val="FFFFFF"/>
+                  </a:solidFill>
+                </a:uFill>
+                <a:ea typeface="DejaVu Sans"/>
+              </a:rPr>
+              <a:t>abgebrochen</a:t>
+            </a:r>
+            <a:r>
+              <a:rPr lang="de-DE" sz="2200" b="0" strike="noStrike" spc="-1">
+                <a:solidFill>
+                  <a:srgbClr val="000000"/>
+                </a:solidFill>
+                <a:uFill>
+                  <a:solidFill>
+                    <a:srgbClr val="FFFFFF"/>
+                  </a:solidFill>
+                </a:uFill>
+                <a:ea typeface="DejaVu Sans"/>
+              </a:rPr>
+              <a:t> ist.</a:t>
+            </a:r>
+            <a:endParaRPr lang="de-DE" sz="2200" b="0" strike="noStrike" spc="-1">
+              <a:solidFill>
+                <a:srgbClr val="000000"/>
+              </a:solidFill>
+              <a:uFill>
+                <a:solidFill>
+                  <a:srgbClr val="FFFFFF"/>
+                </a:solidFill>
+              </a:uFill>
+            </a:endParaRPr>
+          </a:p>
+          <a:p>
+            <a:pPr marL="432000" indent="-323280">
+              <a:lnSpc>
+                <a:spcPct val="100000"/>
+              </a:lnSpc>
+              <a:buClr>
+                <a:srgbClr val="000000"/>
+              </a:buClr>
+              <a:buSzPct val="45000"/>
+              <a:buFont typeface="Wingdings" charset="2"/>
+              <a:buChar char=""/>
+            </a:pPr>
+            <a:r>
+              <a:rPr lang="de-DE" sz="2200" b="0" strike="noStrike" spc="-1" smtClean="0">
+                <a:solidFill>
+                  <a:srgbClr val="000000"/>
+                </a:solidFill>
+                <a:uFill>
+                  <a:solidFill>
+                    <a:srgbClr val="FFFFFF"/>
+                  </a:solidFill>
+                </a:uFill>
+                <a:ea typeface="DejaVu Sans"/>
+              </a:rPr>
+              <a:t>Die </a:t>
+            </a:r>
+            <a:r>
+              <a:rPr lang="de-DE" sz="2200" b="1" strike="noStrike" spc="-1">
+                <a:solidFill>
+                  <a:srgbClr val="000000"/>
+                </a:solidFill>
+                <a:uFill>
+                  <a:solidFill>
+                    <a:srgbClr val="FFFFFF"/>
+                  </a:solidFill>
+                </a:uFill>
+                <a:ea typeface="DejaVu Sans"/>
+              </a:rPr>
+              <a:t>App</a:t>
+            </a:r>
+            <a:r>
+              <a:rPr lang="de-DE" sz="2200" b="0" strike="noStrike" spc="-1">
+                <a:solidFill>
+                  <a:srgbClr val="000000"/>
+                </a:solidFill>
+                <a:uFill>
+                  <a:solidFill>
+                    <a:srgbClr val="FFFFFF"/>
+                  </a:solidFill>
+                </a:uFill>
+                <a:ea typeface="DejaVu Sans"/>
+              </a:rPr>
+              <a:t> wurde zwischenzeitlich </a:t>
+            </a:r>
+            <a:r>
+              <a:rPr lang="de-DE" sz="2200" b="1" strike="noStrike" spc="-1">
+                <a:solidFill>
+                  <a:srgbClr val="000000"/>
+                </a:solidFill>
+                <a:uFill>
+                  <a:solidFill>
+                    <a:srgbClr val="FFFFFF"/>
+                  </a:solidFill>
+                </a:uFill>
+                <a:ea typeface="DejaVu Sans"/>
+              </a:rPr>
+              <a:t>beendet</a:t>
+            </a:r>
+            <a:r>
+              <a:rPr lang="de-DE" sz="2200" b="0" strike="noStrike" spc="-1">
+                <a:solidFill>
+                  <a:srgbClr val="000000"/>
+                </a:solidFill>
+                <a:uFill>
+                  <a:solidFill>
+                    <a:srgbClr val="FFFFFF"/>
+                  </a:solidFill>
+                </a:uFill>
+                <a:ea typeface="DejaVu Sans"/>
+              </a:rPr>
+              <a:t>, die erfolgreiche Registrierung kann nicht </a:t>
+            </a:r>
+            <a:r>
+              <a:rPr lang="de-DE" sz="2200" spc="-1">
+                <a:solidFill>
+                  <a:srgbClr val="000000"/>
+                </a:solidFill>
+                <a:uFill>
+                  <a:solidFill>
+                    <a:srgbClr val="FFFFFF"/>
+                  </a:solidFill>
+                </a:uFill>
+                <a:ea typeface="DejaVu Sans"/>
+              </a:rPr>
+              <a:t>ü</a:t>
+            </a:r>
+            <a:r>
+              <a:rPr lang="de-DE" sz="2200" b="0" strike="noStrike" spc="-1" smtClean="0">
+                <a:solidFill>
+                  <a:srgbClr val="000000"/>
+                </a:solidFill>
+                <a:uFill>
+                  <a:solidFill>
+                    <a:srgbClr val="FFFFFF"/>
+                  </a:solidFill>
+                </a:uFill>
+                <a:ea typeface="DejaVu Sans"/>
+              </a:rPr>
+              <a:t>bermittelt </a:t>
+            </a:r>
+            <a:r>
+              <a:rPr lang="de-DE" sz="2200" b="0" strike="noStrike" spc="-1">
+                <a:solidFill>
+                  <a:srgbClr val="000000"/>
+                </a:solidFill>
+                <a:uFill>
+                  <a:solidFill>
+                    <a:srgbClr val="FFFFFF"/>
+                  </a:solidFill>
+                </a:uFill>
+                <a:ea typeface="DejaVu Sans"/>
+              </a:rPr>
+              <a:t>werden.</a:t>
+            </a:r>
+            <a:endParaRPr lang="de-DE" sz="2200" b="0" strike="noStrike" spc="-1">
+              <a:solidFill>
+                <a:srgbClr val="000000"/>
+              </a:solidFill>
+              <a:uFill>
+                <a:solidFill>
+                  <a:srgbClr val="FFFFFF"/>
+                </a:solidFill>
+              </a:uFill>
+            </a:endParaRPr>
+          </a:p>
+        </p:txBody>
+      </p:sp>
+    </p:spTree>
+    <p:extLst>
+      <p:ext uri="{BB962C8B-B14F-4D97-AF65-F5344CB8AC3E}">
+        <p14:creationId xmlns:p14="http://schemas.microsoft.com/office/powerpoint/2010/main" val="675397051"/>
+      </p:ext>
+    </p:extLst>
+  </p:cSld>
+  <p:clrMapOvr>
+    <a:masterClrMapping/>
+  </p:clrMapOvr>
+</p:sld>
+</file>
+
+<file path=ppt/slides/slide12.xml><?xml version="1.0" encoding="utf-8"?>
+<p:sld xmlns:a="http://schemas.openxmlformats.org/drawingml/2006/main" xmlns:r="http://schemas.openxmlformats.org/officeDocument/2006/relationships" xmlns:p="http://schemas.openxmlformats.org/presentationml/2006/main">
+  <p:cSld>
+    <p:spTree>
+      <p:nvGrpSpPr>
+        <p:cNvPr id="1" name=""/>
+        <p:cNvGrpSpPr/>
+        <p:nvPr/>
+      </p:nvGrpSpPr>
+      <p:grpSpPr>
+        <a:xfrm>
+          <a:off x="0" y="0"/>
+          <a:ext cx="0" cy="0"/>
+          <a:chOff x="0" y="0"/>
+          <a:chExt cx="0" cy="0"/>
+        </a:xfrm>
+      </p:grpSpPr>
+      <p:sp>
+        <p:nvSpPr>
+          <p:cNvPr id="2" name="Titel 1"/>
+          <p:cNvSpPr>
+            <a:spLocks noGrp="1"/>
+          </p:cNvSpPr>
+          <p:nvPr>
+            <p:ph type="title"/>
+          </p:nvPr>
+        </p:nvSpPr>
+        <p:spPr/>
+        <p:txBody>
+          <a:bodyPr/>
+          <a:lstStyle/>
+          <a:p>
+            <a:r>
+              <a:rPr lang="de-DE" smtClean="0"/>
+              <a:t>Registrierung</a:t>
+            </a:r>
+            <a:endParaRPr lang="de-DE"/>
+          </a:p>
+        </p:txBody>
+      </p:sp>
+      <p:sp>
+        <p:nvSpPr>
+          <p:cNvPr id="6" name="CustomShape 2"/>
+          <p:cNvSpPr/>
+          <p:nvPr/>
+        </p:nvSpPr>
+        <p:spPr>
+          <a:xfrm>
+            <a:off x="838080" y="1825560"/>
+            <a:ext cx="5130360" cy="4350240"/>
+          </a:xfrm>
+          <a:prstGeom prst="rect">
+            <a:avLst/>
+          </a:prstGeom>
+          <a:noFill/>
+          <a:ln>
+            <a:noFill/>
+          </a:ln>
+        </p:spPr>
+        <p:style>
+          <a:lnRef idx="0">
+            <a:scrgbClr r="0" g="0" b="0"/>
+          </a:lnRef>
+          <a:fillRef idx="0">
+            <a:scrgbClr r="0" g="0" b="0"/>
+          </a:fillRef>
+          <a:effectRef idx="0">
+            <a:scrgbClr r="0" g="0" b="0"/>
+          </a:effectRef>
+          <a:fontRef idx="minor"/>
+        </p:style>
+        <p:txBody>
+          <a:bodyPr lIns="0" tIns="0" rIns="0" bIns="0" anchor="ctr"/>
+          <a:lstStyle/>
+          <a:p>
+            <a:pPr marL="432000" indent="-323280">
+              <a:lnSpc>
+                <a:spcPct val="150000"/>
+              </a:lnSpc>
+              <a:buClr>
+                <a:srgbClr val="000000"/>
+              </a:buClr>
+              <a:buSzPct val="45000"/>
+              <a:buFont typeface="Wingdings" charset="2"/>
+              <a:buChar char=""/>
+            </a:pPr>
+            <a:r>
+              <a:rPr lang="de-DE" sz="2800" b="0" strike="noStrike" spc="-1">
+                <a:solidFill>
+                  <a:srgbClr val="000000"/>
+                </a:solidFill>
+                <a:uFill>
+                  <a:solidFill>
+                    <a:srgbClr val="FFFFFF"/>
+                  </a:solidFill>
+                </a:uFill>
+                <a:ea typeface="DejaVu Sans"/>
+              </a:rPr>
+              <a:t>Andere </a:t>
+            </a:r>
+            <a:r>
+              <a:rPr lang="de-DE" sz="2800" b="0" strike="noStrike" spc="-1" smtClean="0">
+                <a:solidFill>
+                  <a:srgbClr val="000000"/>
+                </a:solidFill>
+                <a:uFill>
+                  <a:solidFill>
+                    <a:srgbClr val="FFFFFF"/>
+                  </a:solidFill>
+                </a:uFill>
+                <a:ea typeface="DejaVu Sans"/>
+              </a:rPr>
+              <a:t>Aktivitäten</a:t>
+            </a:r>
+            <a:endParaRPr lang="de-DE" sz="2800" b="0" strike="noStrike" spc="-1">
+              <a:solidFill>
+                <a:srgbClr val="000000"/>
+              </a:solidFill>
+              <a:uFill>
+                <a:solidFill>
+                  <a:srgbClr val="FFFFFF"/>
+                </a:solidFill>
+              </a:uFill>
+            </a:endParaRPr>
+          </a:p>
+          <a:p>
+            <a:pPr marL="864000" lvl="1" indent="-323280">
+              <a:lnSpc>
+                <a:spcPct val="150000"/>
+              </a:lnSpc>
+              <a:buClr>
+                <a:srgbClr val="000000"/>
+              </a:buClr>
+              <a:buSzPct val="75000"/>
+              <a:buFont typeface="Symbol"/>
+              <a:buChar char=""/>
+            </a:pPr>
+            <a:r>
+              <a:rPr lang="de-DE" sz="2000" b="0" strike="noStrike" spc="-1">
+                <a:solidFill>
+                  <a:srgbClr val="000000"/>
+                </a:solidFill>
+                <a:uFill>
+                  <a:solidFill>
+                    <a:srgbClr val="FFFFFF"/>
+                  </a:solidFill>
+                </a:uFill>
+                <a:ea typeface="DejaVu Sans"/>
+              </a:rPr>
+              <a:t>gleichzeitige Registrierung</a:t>
+            </a:r>
+            <a:endParaRPr lang="de-DE" sz="2000" b="0" strike="noStrike" spc="-1">
+              <a:solidFill>
+                <a:srgbClr val="000000"/>
+              </a:solidFill>
+              <a:uFill>
+                <a:solidFill>
+                  <a:srgbClr val="FFFFFF"/>
+                </a:solidFill>
+              </a:uFill>
+            </a:endParaRPr>
+          </a:p>
+          <a:p>
+            <a:pPr marL="864000" lvl="1" indent="-323280">
+              <a:lnSpc>
+                <a:spcPct val="150000"/>
+              </a:lnSpc>
+              <a:buClr>
+                <a:srgbClr val="000000"/>
+              </a:buClr>
+              <a:buSzPct val="75000"/>
+              <a:buFont typeface="Symbol"/>
+              <a:buChar char=""/>
+            </a:pPr>
+            <a:r>
+              <a:rPr lang="de-DE" sz="2000" spc="-1">
+                <a:solidFill>
+                  <a:srgbClr val="000000"/>
+                </a:solidFill>
+                <a:uFill>
+                  <a:solidFill>
+                    <a:srgbClr val="FFFFFF"/>
+                  </a:solidFill>
+                </a:uFill>
+                <a:ea typeface="DejaVu Sans"/>
+              </a:rPr>
+              <a:t>e</a:t>
+            </a:r>
+            <a:r>
+              <a:rPr lang="de-DE" sz="2000" b="0" strike="noStrike" spc="-1" smtClean="0">
+                <a:solidFill>
+                  <a:srgbClr val="000000"/>
+                </a:solidFill>
+                <a:uFill>
+                  <a:solidFill>
+                    <a:srgbClr val="FFFFFF"/>
+                  </a:solidFill>
+                </a:uFill>
+                <a:ea typeface="DejaVu Sans"/>
+              </a:rPr>
+              <a:t>vtl. </a:t>
+            </a:r>
+            <a:r>
+              <a:rPr lang="de-DE" sz="2000" b="0" strike="noStrike" spc="-1">
+                <a:solidFill>
+                  <a:srgbClr val="000000"/>
+                </a:solidFill>
+                <a:uFill>
+                  <a:solidFill>
+                    <a:srgbClr val="FFFFFF"/>
+                  </a:solidFill>
+                </a:uFill>
+                <a:ea typeface="DejaVu Sans"/>
+              </a:rPr>
+              <a:t>mit gleichem </a:t>
+            </a:r>
+            <a:r>
+              <a:rPr lang="de-DE" sz="2000" b="0" strike="noStrike" spc="-1" smtClean="0">
+                <a:solidFill>
+                  <a:srgbClr val="000000"/>
+                </a:solidFill>
+                <a:uFill>
+                  <a:solidFill>
+                    <a:srgbClr val="FFFFFF"/>
+                  </a:solidFill>
+                </a:uFill>
+                <a:ea typeface="DejaVu Sans"/>
+              </a:rPr>
+              <a:t>Schlüssel</a:t>
+            </a:r>
+            <a:endParaRPr lang="de-DE" sz="2000" b="0" strike="noStrike" spc="-1">
+              <a:solidFill>
+                <a:srgbClr val="000000"/>
+              </a:solidFill>
+              <a:uFill>
+                <a:solidFill>
+                  <a:srgbClr val="FFFFFF"/>
+                </a:solidFill>
+              </a:uFill>
+            </a:endParaRPr>
+          </a:p>
+          <a:p>
+            <a:pPr marL="864000" lvl="1" indent="-323280">
+              <a:lnSpc>
+                <a:spcPct val="150000"/>
+              </a:lnSpc>
+              <a:buClr>
+                <a:srgbClr val="000000"/>
+              </a:buClr>
+              <a:buSzPct val="75000"/>
+              <a:buFont typeface="Symbol"/>
+              <a:buChar char=""/>
+            </a:pPr>
+            <a:r>
+              <a:rPr lang="de-DE" sz="2000" b="0" strike="noStrike" spc="-1">
+                <a:solidFill>
+                  <a:srgbClr val="000000"/>
+                </a:solidFill>
+                <a:uFill>
+                  <a:solidFill>
+                    <a:srgbClr val="FFFFFF"/>
+                  </a:solidFill>
+                </a:uFill>
+                <a:ea typeface="DejaVu Sans"/>
+              </a:rPr>
+              <a:t>zu viele gleichzeitige Anfragen</a:t>
+            </a:r>
+            <a:endParaRPr lang="de-DE" sz="2000" b="0" strike="noStrike" spc="-1">
+              <a:solidFill>
+                <a:srgbClr val="000000"/>
+              </a:solidFill>
+              <a:uFill>
+                <a:solidFill>
+                  <a:srgbClr val="FFFFFF"/>
+                </a:solidFill>
+              </a:uFill>
+            </a:endParaRPr>
+          </a:p>
+          <a:p>
+            <a:pPr marL="864000" lvl="1" indent="-323280">
+              <a:lnSpc>
+                <a:spcPct val="150000"/>
+              </a:lnSpc>
+              <a:buClr>
+                <a:srgbClr val="000000"/>
+              </a:buClr>
+              <a:buSzPct val="75000"/>
+              <a:buFont typeface="Symbol"/>
+              <a:buChar char=""/>
+            </a:pPr>
+            <a:r>
+              <a:rPr lang="de-DE" sz="2000" b="0" strike="noStrike" spc="-1">
+                <a:solidFill>
+                  <a:srgbClr val="000000"/>
+                </a:solidFill>
+                <a:uFill>
+                  <a:solidFill>
+                    <a:srgbClr val="FFFFFF"/>
+                  </a:solidFill>
+                </a:uFill>
+                <a:ea typeface="DejaVu Sans"/>
+              </a:rPr>
+              <a:t>Abfrage des Datensatzes (vor </a:t>
+            </a:r>
+            <a:r>
+              <a:rPr lang="de-DE" sz="2000" b="0" strike="noStrike" spc="-1" smtClean="0">
+                <a:solidFill>
+                  <a:srgbClr val="000000"/>
+                </a:solidFill>
+                <a:uFill>
+                  <a:solidFill>
+                    <a:srgbClr val="FFFFFF"/>
+                  </a:solidFill>
+                </a:uFill>
+                <a:ea typeface="DejaVu Sans"/>
+              </a:rPr>
+              <a:t>Vollständigkeit</a:t>
+            </a:r>
+            <a:r>
+              <a:rPr lang="de-DE" sz="2000" b="0" strike="noStrike" spc="-1">
+                <a:solidFill>
+                  <a:srgbClr val="000000"/>
+                </a:solidFill>
+                <a:uFill>
+                  <a:solidFill>
+                    <a:srgbClr val="FFFFFF"/>
+                  </a:solidFill>
+                </a:uFill>
+                <a:ea typeface="DejaVu Sans"/>
+              </a:rPr>
+              <a:t>)</a:t>
+            </a:r>
+            <a:endParaRPr lang="de-DE" sz="2000" b="0" strike="noStrike" spc="-1">
+              <a:solidFill>
+                <a:srgbClr val="000000"/>
+              </a:solidFill>
+              <a:uFill>
+                <a:solidFill>
+                  <a:srgbClr val="FFFFFF"/>
+                </a:solidFill>
+              </a:uFill>
+            </a:endParaRPr>
+          </a:p>
+        </p:txBody>
+      </p:sp>
+      <p:sp>
+        <p:nvSpPr>
+          <p:cNvPr id="7" name="CustomShape 3"/>
+          <p:cNvSpPr/>
+          <p:nvPr/>
+        </p:nvSpPr>
+        <p:spPr>
+          <a:xfrm>
+            <a:off x="6226200" y="1825560"/>
+            <a:ext cx="5130360" cy="4350240"/>
+          </a:xfrm>
+          <a:prstGeom prst="rect">
+            <a:avLst/>
+          </a:prstGeom>
+          <a:noFill/>
+          <a:ln>
+            <a:noFill/>
+          </a:ln>
+        </p:spPr>
+        <p:style>
+          <a:lnRef idx="0">
+            <a:scrgbClr r="0" g="0" b="0"/>
+          </a:lnRef>
+          <a:fillRef idx="0">
+            <a:scrgbClr r="0" g="0" b="0"/>
+          </a:fillRef>
+          <a:effectRef idx="0">
+            <a:scrgbClr r="0" g="0" b="0"/>
+          </a:effectRef>
+          <a:fontRef idx="minor"/>
+        </p:style>
+        <p:txBody>
+          <a:bodyPr lIns="0" tIns="0" rIns="0" bIns="0" anchor="ctr"/>
+          <a:lstStyle/>
+          <a:p>
+            <a:pPr marL="432000" indent="-323280">
+              <a:lnSpc>
+                <a:spcPct val="150000"/>
+              </a:lnSpc>
+              <a:buClr>
+                <a:srgbClr val="000000"/>
+              </a:buClr>
+              <a:buSzPct val="45000"/>
+              <a:buFont typeface="Wingdings" charset="2"/>
+              <a:buChar char=""/>
+            </a:pPr>
+            <a:r>
+              <a:rPr lang="de-DE" sz="2800" b="0" strike="noStrike" spc="-1">
+                <a:solidFill>
+                  <a:srgbClr val="000000"/>
+                </a:solidFill>
+                <a:uFill>
+                  <a:solidFill>
+                    <a:srgbClr val="FFFFFF"/>
+                  </a:solidFill>
+                </a:uFill>
+                <a:ea typeface="DejaVu Sans"/>
+              </a:rPr>
+              <a:t>Zustand bei Erfolg</a:t>
+            </a:r>
+            <a:endParaRPr lang="de-DE" sz="2800" b="0" strike="noStrike" spc="-1">
+              <a:solidFill>
+                <a:srgbClr val="000000"/>
+              </a:solidFill>
+              <a:uFill>
+                <a:solidFill>
+                  <a:srgbClr val="FFFFFF"/>
+                </a:solidFill>
+              </a:uFill>
+            </a:endParaRPr>
+          </a:p>
+          <a:p>
+            <a:pPr marL="864000" lvl="1" indent="-323280">
+              <a:lnSpc>
+                <a:spcPct val="150000"/>
+              </a:lnSpc>
+              <a:buClr>
+                <a:srgbClr val="000000"/>
+              </a:buClr>
+              <a:buSzPct val="75000"/>
+              <a:buFont typeface="Symbol"/>
+              <a:buChar char=""/>
+            </a:pPr>
+            <a:r>
+              <a:rPr lang="de-DE" sz="2000" b="0" strike="noStrike" spc="-1">
+                <a:solidFill>
+                  <a:srgbClr val="000000"/>
+                </a:solidFill>
+                <a:uFill>
+                  <a:solidFill>
+                    <a:srgbClr val="FFFFFF"/>
+                  </a:solidFill>
+                </a:uFill>
+                <a:ea typeface="DejaVu Sans"/>
+              </a:rPr>
+              <a:t>User hat Datenbankeintrag</a:t>
+            </a:r>
+            <a:endParaRPr lang="de-DE" sz="2000" b="0" strike="noStrike" spc="-1">
+              <a:solidFill>
+                <a:srgbClr val="000000"/>
+              </a:solidFill>
+              <a:uFill>
+                <a:solidFill>
+                  <a:srgbClr val="FFFFFF"/>
+                </a:solidFill>
+              </a:uFill>
+            </a:endParaRPr>
+          </a:p>
+          <a:p>
+            <a:pPr marL="864000" lvl="1" indent="-323280">
+              <a:lnSpc>
+                <a:spcPct val="150000"/>
+              </a:lnSpc>
+              <a:buClr>
+                <a:srgbClr val="000000"/>
+              </a:buClr>
+              <a:buSzPct val="75000"/>
+              <a:buFont typeface="Symbol"/>
+              <a:buChar char=""/>
+            </a:pPr>
+            <a:r>
+              <a:rPr lang="de-DE" sz="2000" b="0" strike="noStrike" spc="-1">
+                <a:solidFill>
+                  <a:srgbClr val="000000"/>
+                </a:solidFill>
+                <a:uFill>
+                  <a:solidFill>
+                    <a:srgbClr val="FFFFFF"/>
+                  </a:solidFill>
+                </a:uFill>
+                <a:ea typeface="DejaVu Sans"/>
+              </a:rPr>
+              <a:t>User ist in der App eingeloggt</a:t>
+            </a:r>
+            <a:endParaRPr lang="de-DE" sz="2000" b="0" strike="noStrike" spc="-1">
+              <a:solidFill>
+                <a:srgbClr val="000000"/>
+              </a:solidFill>
+              <a:uFill>
+                <a:solidFill>
+                  <a:srgbClr val="FFFFFF"/>
+                </a:solidFill>
+              </a:uFill>
+            </a:endParaRPr>
+          </a:p>
+          <a:p>
+            <a:pPr marL="864000" lvl="1" indent="-323280">
+              <a:lnSpc>
+                <a:spcPct val="150000"/>
+              </a:lnSpc>
+              <a:buClr>
+                <a:srgbClr val="000000"/>
+              </a:buClr>
+              <a:buSzPct val="75000"/>
+              <a:buFont typeface="Symbol"/>
+              <a:buChar char=""/>
+            </a:pPr>
+            <a:r>
+              <a:rPr lang="de-DE" sz="2000" b="0" strike="noStrike" spc="-1">
+                <a:solidFill>
+                  <a:srgbClr val="000000"/>
+                </a:solidFill>
+                <a:uFill>
+                  <a:solidFill>
+                    <a:srgbClr val="FFFFFF"/>
+                  </a:solidFill>
+                </a:uFill>
+                <a:ea typeface="DejaVu Sans"/>
+              </a:rPr>
+              <a:t>Server und Client sind bereit zur Kommunikation</a:t>
+            </a:r>
+            <a:endParaRPr lang="de-DE" sz="2000" b="0" strike="noStrike" spc="-1">
+              <a:solidFill>
+                <a:srgbClr val="000000"/>
+              </a:solidFill>
+              <a:uFill>
+                <a:solidFill>
+                  <a:srgbClr val="FFFFFF"/>
+                </a:solidFill>
+              </a:uFill>
+            </a:endParaRPr>
+          </a:p>
+        </p:txBody>
+      </p:sp>
+    </p:spTree>
+    <p:extLst>
+      <p:ext uri="{BB962C8B-B14F-4D97-AF65-F5344CB8AC3E}">
+        <p14:creationId xmlns:p14="http://schemas.microsoft.com/office/powerpoint/2010/main" val="3539064446"/>
+      </p:ext>
+    </p:extLst>
+  </p:cSld>
+  <p:clrMapOvr>
+    <a:masterClrMapping/>
+  </p:clrMapOvr>
+</p:sld>
+</file>
+
 <file path=ppt/slides/slide2.xml><?xml version="1.0" encoding="utf-8"?>
 <p:sld xmlns:a="http://schemas.openxmlformats.org/drawingml/2006/main" xmlns:r="http://schemas.openxmlformats.org/officeDocument/2006/relationships" xmlns:p="http://schemas.openxmlformats.org/presentationml/2006/main">
   <p:cSld>
@@ -3554,7 +6096,7 @@
           <p:cNvPr id="2" name="Titel 1">
             <a:extLst>
               <a:ext uri="{FF2B5EF4-FFF2-40B4-BE49-F238E27FC236}">
-                <a16:creationId xmlns:a16="http://schemas.microsoft.com/office/drawing/2014/main" xmlns="" id="{D0906378-B0DE-4FBD-8795-C75AA5D9BE5F}"/>
+                <a16:creationId xmlns="" xmlns:a16="http://schemas.microsoft.com/office/drawing/2014/main" id="{D0906378-B0DE-4FBD-8795-C75AA5D9BE5F}"/>
               </a:ext>
             </a:extLst>
           </p:cNvPr>
@@ -3584,7 +6126,7 @@
           <p:cNvPr id="3" name="Inhaltsplatzhalter 2">
             <a:extLst>
               <a:ext uri="{FF2B5EF4-FFF2-40B4-BE49-F238E27FC236}">
-                <a16:creationId xmlns:a16="http://schemas.microsoft.com/office/drawing/2014/main" xmlns="" id="{79826641-65A9-4C2F-83AD-48817B716780}"/>
+                <a16:creationId xmlns="" xmlns:a16="http://schemas.microsoft.com/office/drawing/2014/main" id="{79826641-65A9-4C2F-83AD-48817B716780}"/>
               </a:ext>
             </a:extLst>
           </p:cNvPr>
@@ -3712,7 +6254,7 @@
           <p:cNvPr id="3" name="Inhaltsplatzhalter 2">
             <a:extLst>
               <a:ext uri="{FF2B5EF4-FFF2-40B4-BE49-F238E27FC236}">
-                <a16:creationId xmlns:a16="http://schemas.microsoft.com/office/drawing/2014/main" xmlns="" id="{8D4F619E-95AB-45CB-8E91-113A697041A2}"/>
+                <a16:creationId xmlns="" xmlns:a16="http://schemas.microsoft.com/office/drawing/2014/main" id="{8D4F619E-95AB-45CB-8E91-113A697041A2}"/>
               </a:ext>
             </a:extLst>
           </p:cNvPr>
@@ -3859,7 +6401,7 @@
           <p:cNvPr id="2" name="Titel 1">
             <a:extLst>
               <a:ext uri="{FF2B5EF4-FFF2-40B4-BE49-F238E27FC236}">
-                <a16:creationId xmlns:a16="http://schemas.microsoft.com/office/drawing/2014/main" xmlns="" id="{990FDC04-66A3-4FD6-B4C8-0EFE4909D837}"/>
+                <a16:creationId xmlns="" xmlns:a16="http://schemas.microsoft.com/office/drawing/2014/main" id="{990FDC04-66A3-4FD6-B4C8-0EFE4909D837}"/>
               </a:ext>
             </a:extLst>
           </p:cNvPr>
@@ -3895,7 +6437,7 @@
           <p:cNvPr id="3" name="Inhaltsplatzhalter 2">
             <a:extLst>
               <a:ext uri="{FF2B5EF4-FFF2-40B4-BE49-F238E27FC236}">
-                <a16:creationId xmlns:a16="http://schemas.microsoft.com/office/drawing/2014/main" xmlns="" id="{142E594E-C74B-468D-A9D0-3083E64A491F}"/>
+                <a16:creationId xmlns="" xmlns:a16="http://schemas.microsoft.com/office/drawing/2014/main" id="{142E594E-C74B-468D-A9D0-3083E64A491F}"/>
               </a:ext>
             </a:extLst>
           </p:cNvPr>
@@ -4019,7 +6561,7 @@
           <p:cNvPr id="2" name="Titel 1">
             <a:extLst>
               <a:ext uri="{FF2B5EF4-FFF2-40B4-BE49-F238E27FC236}">
-                <a16:creationId xmlns:a16="http://schemas.microsoft.com/office/drawing/2014/main" xmlns="" id="{75DFA60C-68DF-47E3-923E-8E3E3B205A99}"/>
+                <a16:creationId xmlns="" xmlns:a16="http://schemas.microsoft.com/office/drawing/2014/main" id="{75DFA60C-68DF-47E3-923E-8E3E3B205A99}"/>
               </a:ext>
             </a:extLst>
           </p:cNvPr>
@@ -4063,7 +6605,7 @@
           <p:cNvPr id="3" name="Inhaltsplatzhalter 2">
             <a:extLst>
               <a:ext uri="{FF2B5EF4-FFF2-40B4-BE49-F238E27FC236}">
-                <a16:creationId xmlns:a16="http://schemas.microsoft.com/office/drawing/2014/main" xmlns="" id="{219249C6-8440-47B8-9F4C-7F856A639D04}"/>
+                <a16:creationId xmlns="" xmlns:a16="http://schemas.microsoft.com/office/drawing/2014/main" id="{219249C6-8440-47B8-9F4C-7F856A639D04}"/>
               </a:ext>
             </a:extLst>
           </p:cNvPr>
@@ -4128,6 +6670,124 @@
     <p:extLst>
       <p:ext uri="{BB962C8B-B14F-4D97-AF65-F5344CB8AC3E}">
         <p14:creationId xmlns:p14="http://schemas.microsoft.com/office/powerpoint/2010/main" val="4247931517"/>
+      </p:ext>
+    </p:extLst>
+  </p:cSld>
+  <p:clrMapOvr>
+    <a:masterClrMapping/>
+  </p:clrMapOvr>
+</p:sld>
+</file>
+
+<file path=ppt/slides/slide9.xml><?xml version="1.0" encoding="utf-8"?>
+<p:sld xmlns:a="http://schemas.openxmlformats.org/drawingml/2006/main" xmlns:r="http://schemas.openxmlformats.org/officeDocument/2006/relationships" xmlns:p="http://schemas.openxmlformats.org/presentationml/2006/main">
+  <p:cSld>
+    <p:spTree>
+      <p:nvGrpSpPr>
+        <p:cNvPr id="1" name=""/>
+        <p:cNvGrpSpPr/>
+        <p:nvPr/>
+      </p:nvGrpSpPr>
+      <p:grpSpPr>
+        <a:xfrm>
+          <a:off x="0" y="0"/>
+          <a:ext cx="0" cy="0"/>
+          <a:chOff x="0" y="0"/>
+          <a:chExt cx="0" cy="0"/>
+        </a:xfrm>
+      </p:grpSpPr>
+      <p:sp>
+        <p:nvSpPr>
+          <p:cNvPr id="2" name="Titel 1"/>
+          <p:cNvSpPr>
+            <a:spLocks noGrp="1"/>
+          </p:cNvSpPr>
+          <p:nvPr>
+            <p:ph type="title"/>
+          </p:nvPr>
+        </p:nvSpPr>
+        <p:spPr/>
+        <p:txBody>
+          <a:bodyPr/>
+          <a:lstStyle/>
+          <a:p>
+            <a:r>
+              <a:rPr lang="de-DE" spc="-1">
+                <a:solidFill>
+                  <a:srgbClr val="000000"/>
+                </a:solidFill>
+                <a:uFill>
+                  <a:solidFill>
+                    <a:srgbClr val="FFFFFF"/>
+                  </a:solidFill>
+                </a:uFill>
+                <a:ea typeface="DejaVu Sans"/>
+              </a:rPr>
+              <a:t>Szenario: Registrierung </a:t>
+            </a:r>
+            <a:r>
+              <a:rPr lang="de-DE" spc="-1">
+                <a:solidFill>
+                  <a:srgbClr val="000000"/>
+                </a:solidFill>
+                <a:uFill>
+                  <a:solidFill>
+                    <a:srgbClr val="FFFFFF"/>
+                  </a:solidFill>
+                </a:uFill>
+                <a:ea typeface="DejaVu Sans"/>
+              </a:rPr>
+              <a:t>als </a:t>
+            </a:r>
+            <a:r>
+              <a:rPr lang="de-DE" spc="-1" smtClean="0">
+                <a:solidFill>
+                  <a:srgbClr val="000000"/>
+                </a:solidFill>
+                <a:uFill>
+                  <a:solidFill>
+                    <a:srgbClr val="FFFFFF"/>
+                  </a:solidFill>
+                </a:uFill>
+                <a:ea typeface="DejaVu Sans"/>
+              </a:rPr>
+              <a:t>Client</a:t>
+            </a:r>
+            <a:endParaRPr lang="de-DE"/>
+          </a:p>
+        </p:txBody>
+      </p:sp>
+      <p:pic>
+        <p:nvPicPr>
+          <p:cNvPr id="4" name="Inhaltsplatzhalter 3"/>
+          <p:cNvPicPr>
+            <a:picLocks noGrp="1"/>
+          </p:cNvPicPr>
+          <p:nvPr>
+            <p:ph idx="1"/>
+          </p:nvPr>
+        </p:nvPicPr>
+        <p:blipFill>
+          <a:blip r:embed="rId2"/>
+          <a:stretch/>
+        </p:blipFill>
+        <p:spPr>
+          <a:xfrm>
+            <a:off x="3489784" y="1984400"/>
+            <a:ext cx="5212432" cy="4033788"/>
+          </a:xfrm>
+          <a:prstGeom prst="rect">
+            <a:avLst/>
+          </a:prstGeom>
+          <a:ln>
+            <a:noFill/>
+          </a:ln>
+        </p:spPr>
+      </p:pic>
+    </p:spTree>
+    <p:extLst>
+      <p:ext uri="{BB962C8B-B14F-4D97-AF65-F5344CB8AC3E}">
+        <p14:creationId xmlns:p14="http://schemas.microsoft.com/office/powerpoint/2010/main" val="1029358171"/>
       </p:ext>
     </p:extLst>
   </p:cSld>

</xml_diff>